<commit_message>
Updated title. Testing commit.
</commit_message>
<xml_diff>
--- a/HuBMAP_template.pptx
+++ b/HuBMAP_template.pptx
@@ -18,7 +18,7 @@
   <p:notesSz cx="6858000" cy="9144000"/>
   <p:embeddedFontLst>
     <p:embeddedFont>
-      <p:font typeface="Inter" panose="020B0604020202020204" charset="0"/>
+      <p:font typeface="Inter" panose="02000503000000020004" pitchFamily="2" charset="0"/>
       <p:regular r:id="rId8"/>
       <p:bold r:id="rId9"/>
       <p:italic r:id="rId10"/>
@@ -18300,7 +18300,7 @@
               <a:buNone/>
             </a:pPr>
             <a:r>
-              <a:rPr lang="en" sz="1400" b="0" i="0" u="none" strike="noStrike" cap="none">
+              <a:rPr lang="en" sz="1400" b="0" i="0" u="none" strike="noStrike" cap="none" dirty="0">
                 <a:solidFill>
                   <a:srgbClr val="000000"/>
                 </a:solidFill>
@@ -18311,7 +18311,7 @@
               </a:rPr>
               <a:t>Phil Blood</a:t>
             </a:r>
-            <a:endParaRPr sz="1400" b="0" i="0" u="none" strike="noStrike" cap="none">
+            <a:endParaRPr sz="1400" b="0" i="0" u="none" strike="noStrike" cap="none" dirty="0">
               <a:solidFill>
                 <a:srgbClr val="000000"/>
               </a:solidFill>
@@ -18340,7 +18340,7 @@
               <a:buNone/>
             </a:pPr>
             <a:r>
-              <a:rPr lang="en" sz="1400" b="0" i="0" u="none" strike="noStrike" cap="none">
+              <a:rPr lang="en" sz="1400" b="0" i="0" u="none" strike="noStrike" cap="none" dirty="0">
                 <a:solidFill>
                   <a:srgbClr val="000000"/>
                 </a:solidFill>
@@ -18351,7 +18351,7 @@
               </a:rPr>
               <a:t>Alex Ropelewski</a:t>
             </a:r>
-            <a:endParaRPr sz="1400" b="0" i="0" u="none" strike="noStrike" cap="none">
+            <a:endParaRPr sz="1400" b="0" i="0" u="none" strike="noStrike" cap="none" dirty="0">
               <a:solidFill>
                 <a:srgbClr val="000000"/>
               </a:solidFill>
@@ -18379,7 +18379,7 @@
               <a:buFont typeface="Open Sans"/>
               <a:buNone/>
             </a:pPr>
-            <a:endParaRPr sz="1400" b="0" i="0" u="none" strike="noStrike" cap="none">
+            <a:endParaRPr sz="1400" b="0" i="0" u="none" strike="noStrike" cap="none" dirty="0">
               <a:solidFill>
                 <a:srgbClr val="000000"/>
               </a:solidFill>
@@ -18408,7 +18408,7 @@
               <a:buNone/>
             </a:pPr>
             <a:r>
-              <a:rPr lang="en" sz="1400" b="0" i="0" u="none" strike="noStrike" cap="none">
+              <a:rPr lang="en" sz="1400" b="0" i="0" u="none" strike="noStrike" cap="none" dirty="0">
                 <a:solidFill>
                   <a:srgbClr val="000000"/>
                 </a:solidFill>
@@ -18419,7 +18419,7 @@
               </a:rPr>
               <a:t>Pittsburgh Supercomputing Center (PSC)</a:t>
             </a:r>
-            <a:endParaRPr sz="1400" b="0" i="0" u="none" strike="noStrike" cap="none">
+            <a:endParaRPr sz="1400" b="0" i="0" u="none" strike="noStrike" cap="none" dirty="0">
               <a:solidFill>
                 <a:srgbClr val="000000"/>
               </a:solidFill>
@@ -18448,7 +18448,7 @@
               <a:buNone/>
             </a:pPr>
             <a:r>
-              <a:rPr lang="en" sz="1400" b="0" i="0" u="none" strike="noStrike" cap="none">
+              <a:rPr lang="en" sz="1400" b="0" i="0" u="none" strike="noStrike" cap="none" dirty="0">
                 <a:solidFill>
                   <a:srgbClr val="000000"/>
                 </a:solidFill>
@@ -18459,7 +18459,7 @@
               </a:rPr>
               <a:t>Carnegie Mellon University</a:t>
             </a:r>
-            <a:endParaRPr sz="1400" b="0" i="0" u="none" strike="noStrike" cap="none">
+            <a:endParaRPr sz="1400" b="0" i="0" u="none" strike="noStrike" cap="none" dirty="0">
               <a:solidFill>
                 <a:srgbClr val="000000"/>
               </a:solidFill>
@@ -18517,15 +18517,52 @@
               <a:buFont typeface="Open Sans"/>
               <a:buNone/>
             </a:pPr>
+            <a:br>
+              <a:rPr lang="en" sz="3800" dirty="0">
+                <a:solidFill>
+                  <a:srgbClr val="BB002A"/>
+                </a:solidFill>
+              </a:rPr>
+            </a:br>
             <a:r>
-              <a:rPr lang="en" sz="3800">
+              <a:rPr lang="en" sz="3800" dirty="0" err="1">
                 <a:solidFill>
                   <a:srgbClr val="BB002A"/>
                 </a:solidFill>
               </a:rPr>
-              <a:t>HuBMAP xxx</a:t>
+              <a:t>HuBMAP</a:t>
             </a:r>
-            <a:endParaRPr sz="3800">
+            <a:r>
+              <a:rPr lang="en" sz="3800" dirty="0">
+                <a:solidFill>
+                  <a:srgbClr val="BB002A"/>
+                </a:solidFill>
+              </a:rPr>
+              <a:t> Internship – </a:t>
+            </a:r>
+            <a:br>
+              <a:rPr lang="en" sz="3800" dirty="0">
+                <a:solidFill>
+                  <a:srgbClr val="BB002A"/>
+                </a:solidFill>
+              </a:rPr>
+            </a:br>
+            <a:r>
+              <a:rPr lang="en" sz="3800" dirty="0">
+                <a:solidFill>
+                  <a:srgbClr val="BB002A"/>
+                </a:solidFill>
+              </a:rPr>
+              <a:t>Jack Lasota</a:t>
+            </a:r>
+            <a:br>
+              <a:rPr lang="en" sz="3800" dirty="0">
+                <a:solidFill>
+                  <a:srgbClr val="BB002A"/>
+                </a:solidFill>
+              </a:rPr>
+            </a:br>
+            <a:endParaRPr sz="3800" dirty="0">
               <a:solidFill>
                 <a:srgbClr val="BB002A"/>
               </a:solidFill>
@@ -18549,15 +18586,7 @@
               <a:buFont typeface="Open Sans"/>
               <a:buNone/>
             </a:pPr>
-            <a:r>
-              <a:rPr lang="en" sz="3280" i="1">
-                <a:solidFill>
-                  <a:srgbClr val="BB002A"/>
-                </a:solidFill>
-              </a:rPr>
-              <a:t>xxx</a:t>
-            </a:r>
-            <a:endParaRPr b="0" i="1" u="none" strike="noStrike" cap="none">
+            <a:endParaRPr b="0" i="1" u="none" strike="noStrike" cap="none" dirty="0">
               <a:solidFill>
                 <a:srgbClr val="BB002A"/>
               </a:solidFill>
@@ -18838,6 +18867,38 @@
           </a:ln>
         </p:spPr>
       </p:pic>
+      <p:sp>
+        <p:nvSpPr>
+          <p:cNvPr id="3" name="TextBox 2">
+            <a:extLst>
+              <a:ext uri="{FF2B5EF4-FFF2-40B4-BE49-F238E27FC236}">
+                <a16:creationId xmlns:a16="http://schemas.microsoft.com/office/drawing/2014/main" id="{22384AC6-417A-998A-336C-34E9F1F23D94}"/>
+              </a:ext>
+            </a:extLst>
+          </p:cNvPr>
+          <p:cNvSpPr txBox="1"/>
+          <p:nvPr/>
+        </p:nvSpPr>
+        <p:spPr>
+          <a:xfrm>
+            <a:off x="6525491" y="374073"/>
+            <a:ext cx="184731" cy="307777"/>
+          </a:xfrm>
+          <a:prstGeom prst="rect">
+            <a:avLst/>
+          </a:prstGeom>
+          <a:noFill/>
+        </p:spPr>
+        <p:txBody>
+          <a:bodyPr wrap="none" rtlCol="0">
+            <a:spAutoFit/>
+          </a:bodyPr>
+          <a:lstStyle/>
+          <a:p>
+            <a:endParaRPr lang="en-US" dirty="0"/>
+          </a:p>
+        </p:txBody>
+      </p:sp>
     </p:spTree>
   </p:cSld>
   <p:clrMapOvr>
@@ -18990,14 +19051,9 @@
               </a:rPr>
               <a:t>Quick tour of HuBMAP Consortium Portal (~2)</a:t>
             </a:r>
-            <a:endParaRPr sz="2000" dirty="0">
-              <a:solidFill>
-                <a:srgbClr val="000000"/>
-              </a:solidFill>
-            </a:endParaRPr>
           </a:p>
           <a:p>
-            <a:pPr marL="457200" lvl="0" indent="-355600" algn="l" rtl="0">
+            <a:pPr marL="457200" lvl="0" indent="-317500" algn="l" rtl="0">
               <a:lnSpc>
                 <a:spcPct val="150000"/>
               </a:lnSpc>
@@ -19007,10 +19063,7 @@
               <a:spcAft>
                 <a:spcPts val="0"/>
               </a:spcAft>
-              <a:buClr>
-                <a:srgbClr val="000000"/>
-              </a:buClr>
-              <a:buSzPts val="2000"/>
+              <a:buSzPts val="1400"/>
               <a:buChar char="●"/>
             </a:pPr>
             <a:r>
@@ -19042,7 +19095,7 @@
               <a:buChar char="●"/>
             </a:pPr>
             <a:r>
-              <a:rPr lang="en-US" sz="1000">
+              <a:rPr lang="en-US" sz="1000" dirty="0">
                 <a:solidFill>
                   <a:srgbClr val="454545"/>
                 </a:solidFill>
@@ -19232,7 +19285,7 @@
               <a:buSzPts val="2000"/>
               <a:buNone/>
             </a:pPr>
-            <a:endParaRPr/>
+            <a:endParaRPr dirty="0"/>
           </a:p>
         </p:txBody>
       </p:sp>

</xml_diff>

<commit_message>
Data processing pipeline slides. Raw and processed data.
</commit_message>
<xml_diff>
--- a/HuBMAP_template.pptx
+++ b/HuBMAP_template.pptx
@@ -6,44 +6,48 @@
     <p:sldMasterId id="2147483677" r:id="rId2"/>
   </p:sldMasterIdLst>
   <p:notesMasterIdLst>
-    <p:notesMasterId r:id="rId7"/>
+    <p:notesMasterId r:id="rId11"/>
   </p:notesMasterIdLst>
   <p:sldIdLst>
     <p:sldId id="256" r:id="rId3"/>
     <p:sldId id="257" r:id="rId4"/>
     <p:sldId id="258" r:id="rId5"/>
-    <p:sldId id="259" r:id="rId6"/>
+    <p:sldId id="262" r:id="rId6"/>
+    <p:sldId id="261" r:id="rId7"/>
+    <p:sldId id="260" r:id="rId8"/>
+    <p:sldId id="263" r:id="rId9"/>
+    <p:sldId id="259" r:id="rId10"/>
   </p:sldIdLst>
   <p:sldSz cx="9144000" cy="5143500" type="screen16x9"/>
   <p:notesSz cx="6858000" cy="9144000"/>
   <p:embeddedFontLst>
     <p:embeddedFont>
       <p:font typeface="Inter" panose="02000503000000020004" pitchFamily="2" charset="0"/>
-      <p:regular r:id="rId8"/>
-      <p:bold r:id="rId9"/>
-      <p:italic r:id="rId10"/>
-      <p:boldItalic r:id="rId11"/>
-    </p:embeddedFont>
-    <p:embeddedFont>
-      <p:font typeface="Lato" panose="020F0502020204030203" pitchFamily="34" charset="0"/>
       <p:regular r:id="rId12"/>
       <p:bold r:id="rId13"/>
       <p:italic r:id="rId14"/>
       <p:boldItalic r:id="rId15"/>
     </p:embeddedFont>
     <p:embeddedFont>
-      <p:font typeface="Open Sans" panose="020B0606030504020204" pitchFamily="34" charset="0"/>
+      <p:font typeface="Lato" panose="020F0502020204030203" pitchFamily="34" charset="0"/>
       <p:regular r:id="rId16"/>
       <p:bold r:id="rId17"/>
       <p:italic r:id="rId18"/>
       <p:boldItalic r:id="rId19"/>
     </p:embeddedFont>
     <p:embeddedFont>
-      <p:font typeface="Open Sans SemiBold" panose="020F0502020204030204" pitchFamily="34" charset="0"/>
+      <p:font typeface="Open Sans" panose="020B0606030504020204" pitchFamily="34" charset="0"/>
       <p:regular r:id="rId20"/>
       <p:bold r:id="rId21"/>
       <p:italic r:id="rId22"/>
       <p:boldItalic r:id="rId23"/>
+    </p:embeddedFont>
+    <p:embeddedFont>
+      <p:font typeface="Open Sans SemiBold" panose="020F0502020204030204" pitchFamily="34" charset="0"/>
+      <p:regular r:id="rId24"/>
+      <p:bold r:id="rId25"/>
+      <p:italic r:id="rId26"/>
+      <p:boldItalic r:id="rId27"/>
     </p:embeddedFont>
   </p:embeddedFontLst>
   <p:defaultTextStyle>
@@ -18265,7 +18269,7 @@
         </p:nvSpPr>
         <p:spPr>
           <a:xfrm>
-            <a:off x="2643800" y="2695700"/>
+            <a:off x="3181091" y="3340431"/>
             <a:ext cx="3479400" cy="1552200"/>
           </a:xfrm>
           <a:prstGeom prst="rect">
@@ -18299,22 +18303,7 @@
               <a:buFont typeface="Open Sans"/>
               <a:buNone/>
             </a:pPr>
-            <a:r>
-              <a:rPr lang="en" sz="1400" b="0" i="0" u="none" strike="noStrike" cap="none" dirty="0">
-                <a:solidFill>
-                  <a:srgbClr val="000000"/>
-                </a:solidFill>
-                <a:latin typeface="Open Sans SemiBold"/>
-                <a:ea typeface="Open Sans SemiBold"/>
-                <a:cs typeface="Open Sans SemiBold"/>
-                <a:sym typeface="Open Sans SemiBold"/>
-              </a:rPr>
-              <a:t>Phil Blood</a:t>
-            </a:r>
-            <a:endParaRPr sz="1400" b="0" i="0" u="none" strike="noStrike" cap="none" dirty="0">
-              <a:solidFill>
-                <a:srgbClr val="000000"/>
-              </a:solidFill>
+            <a:endParaRPr lang="en" dirty="0">
               <a:latin typeface="Open Sans SemiBold"/>
               <a:ea typeface="Open Sans SemiBold"/>
               <a:cs typeface="Open Sans SemiBold"/>
@@ -18340,45 +18329,14 @@
               <a:buNone/>
             </a:pPr>
             <a:r>
-              <a:rPr lang="en" sz="1400" b="0" i="0" u="none" strike="noStrike" cap="none" dirty="0">
-                <a:solidFill>
-                  <a:srgbClr val="000000"/>
-                </a:solidFill>
+              <a:rPr lang="en" dirty="0">
                 <a:latin typeface="Open Sans SemiBold"/>
                 <a:ea typeface="Open Sans SemiBold"/>
                 <a:cs typeface="Open Sans SemiBold"/>
                 <a:sym typeface="Open Sans SemiBold"/>
               </a:rPr>
-              <a:t>Alex Ropelewski</a:t>
+              <a:t>Jack Lasota</a:t>
             </a:r>
-            <a:endParaRPr sz="1400" b="0" i="0" u="none" strike="noStrike" cap="none" dirty="0">
-              <a:solidFill>
-                <a:srgbClr val="000000"/>
-              </a:solidFill>
-              <a:latin typeface="Open Sans SemiBold"/>
-              <a:ea typeface="Open Sans SemiBold"/>
-              <a:cs typeface="Open Sans SemiBold"/>
-              <a:sym typeface="Open Sans SemiBold"/>
-            </a:endParaRPr>
-          </a:p>
-          <a:p>
-            <a:pPr marL="0" marR="0" lvl="0" indent="0" algn="ctr" rtl="0">
-              <a:lnSpc>
-                <a:spcPct val="100000"/>
-              </a:lnSpc>
-              <a:spcBef>
-                <a:spcPts val="0"/>
-              </a:spcBef>
-              <a:spcAft>
-                <a:spcPts val="0"/>
-              </a:spcAft>
-              <a:buClr>
-                <a:srgbClr val="000000"/>
-              </a:buClr>
-              <a:buSzPts val="1400"/>
-              <a:buFont typeface="Open Sans"/>
-              <a:buNone/>
-            </a:pPr>
             <a:endParaRPr sz="1400" b="0" i="0" u="none" strike="noStrike" cap="none" dirty="0">
               <a:solidFill>
                 <a:srgbClr val="000000"/>
@@ -18457,7 +18415,7 @@
                 <a:cs typeface="Open Sans"/>
                 <a:sym typeface="Open Sans"/>
               </a:rPr>
-              <a:t>Carnegie Mellon University</a:t>
+              <a:t>Carnegie Mellon University / University of Pittsburgh</a:t>
             </a:r>
             <a:endParaRPr sz="1400" b="0" i="0" u="none" strike="noStrike" cap="none" dirty="0">
               <a:solidFill>
@@ -18483,8 +18441,8 @@
         </p:nvSpPr>
         <p:spPr>
           <a:xfrm>
-            <a:off x="0" y="1301750"/>
-            <a:ext cx="9144000" cy="1612800"/>
+            <a:off x="999241" y="1371818"/>
+            <a:ext cx="7843100" cy="1612800"/>
           </a:xfrm>
           <a:prstGeom prst="rect">
             <a:avLst/>
@@ -18525,6 +18483,14 @@
               </a:rPr>
             </a:br>
             <a:r>
+              <a:rPr lang="en" sz="3800" dirty="0">
+                <a:solidFill>
+                  <a:srgbClr val="BB002A"/>
+                </a:solidFill>
+              </a:rPr>
+              <a:t>Developing Pipelines for Processing Large </a:t>
+            </a:r>
+            <a:r>
               <a:rPr lang="en" sz="3800" dirty="0" err="1">
                 <a:solidFill>
                   <a:srgbClr val="BB002A"/>
@@ -18538,30 +18504,8 @@
                   <a:srgbClr val="BB002A"/>
                 </a:solidFill>
               </a:rPr>
-              <a:t> Internship – </a:t>
+              <a:t> Data Sets</a:t>
             </a:r>
-            <a:br>
-              <a:rPr lang="en" sz="3800" dirty="0">
-                <a:solidFill>
-                  <a:srgbClr val="BB002A"/>
-                </a:solidFill>
-              </a:rPr>
-            </a:br>
-            <a:r>
-              <a:rPr lang="en" sz="3800" dirty="0">
-                <a:solidFill>
-                  <a:srgbClr val="BB002A"/>
-                </a:solidFill>
-              </a:rPr>
-              <a:t>Jack Lasota</a:t>
-            </a:r>
-            <a:br>
-              <a:rPr lang="en" sz="3800" dirty="0">
-                <a:solidFill>
-                  <a:srgbClr val="BB002A"/>
-                </a:solidFill>
-              </a:rPr>
-            </a:br>
             <a:endParaRPr sz="3800" dirty="0">
               <a:solidFill>
                 <a:srgbClr val="BB002A"/>
@@ -18589,192 +18533,6 @@
             <a:endParaRPr b="0" i="1" u="none" strike="noStrike" cap="none" dirty="0">
               <a:solidFill>
                 <a:srgbClr val="BB002A"/>
-              </a:solidFill>
-              <a:latin typeface="Open Sans"/>
-              <a:ea typeface="Open Sans"/>
-              <a:cs typeface="Open Sans"/>
-              <a:sym typeface="Open Sans"/>
-            </a:endParaRPr>
-          </a:p>
-        </p:txBody>
-      </p:sp>
-      <p:sp>
-        <p:nvSpPr>
-          <p:cNvPr id="141" name="Google Shape;141;p31"/>
-          <p:cNvSpPr/>
-          <p:nvPr/>
-        </p:nvSpPr>
-        <p:spPr>
-          <a:xfrm>
-            <a:off x="2446550" y="3836075"/>
-            <a:ext cx="3873900" cy="1397700"/>
-          </a:xfrm>
-          <a:prstGeom prst="rect">
-            <a:avLst/>
-          </a:prstGeom>
-          <a:noFill/>
-          <a:ln>
-            <a:noFill/>
-          </a:ln>
-        </p:spPr>
-        <p:txBody>
-          <a:bodyPr spcFirstLastPara="1" wrap="square" lIns="34275" tIns="34275" rIns="34275" bIns="34275" anchor="t" anchorCtr="0">
-            <a:noAutofit/>
-          </a:bodyPr>
-          <a:lstStyle/>
-          <a:p>
-            <a:pPr marL="0" marR="0" lvl="0" indent="0" algn="ctr" rtl="0">
-              <a:lnSpc>
-                <a:spcPct val="100000"/>
-              </a:lnSpc>
-              <a:spcBef>
-                <a:spcPts val="0"/>
-              </a:spcBef>
-              <a:spcAft>
-                <a:spcPts val="0"/>
-              </a:spcAft>
-              <a:buClr>
-                <a:srgbClr val="000000"/>
-              </a:buClr>
-              <a:buSzPts val="1400"/>
-              <a:buFont typeface="Open Sans"/>
-              <a:buNone/>
-            </a:pPr>
-            <a:r>
-              <a:rPr lang="en" sz="1400" b="0" i="0" u="none" strike="noStrike" cap="none">
-                <a:solidFill>
-                  <a:srgbClr val="000000"/>
-                </a:solidFill>
-                <a:latin typeface="Open Sans SemiBold"/>
-                <a:ea typeface="Open Sans SemiBold"/>
-                <a:cs typeface="Open Sans SemiBold"/>
-                <a:sym typeface="Open Sans SemiBold"/>
-              </a:rPr>
-              <a:t>Jonathan Silverstein</a:t>
-            </a:r>
-            <a:endParaRPr sz="1400" b="0" i="0" u="none" strike="noStrike" cap="none">
-              <a:solidFill>
-                <a:srgbClr val="000000"/>
-              </a:solidFill>
-              <a:latin typeface="Open Sans SemiBold"/>
-              <a:ea typeface="Open Sans SemiBold"/>
-              <a:cs typeface="Open Sans SemiBold"/>
-              <a:sym typeface="Open Sans SemiBold"/>
-            </a:endParaRPr>
-          </a:p>
-          <a:p>
-            <a:pPr marL="0" marR="0" lvl="0" indent="0" algn="ctr" rtl="0">
-              <a:lnSpc>
-                <a:spcPct val="100000"/>
-              </a:lnSpc>
-              <a:spcBef>
-                <a:spcPts val="0"/>
-              </a:spcBef>
-              <a:spcAft>
-                <a:spcPts val="0"/>
-              </a:spcAft>
-              <a:buClr>
-                <a:srgbClr val="000000"/>
-              </a:buClr>
-              <a:buSzPts val="1400"/>
-              <a:buFont typeface="Open Sans"/>
-              <a:buNone/>
-            </a:pPr>
-            <a:r>
-              <a:rPr lang="en" sz="1400" b="0" i="0" u="none" strike="noStrike" cap="none">
-                <a:solidFill>
-                  <a:srgbClr val="000000"/>
-                </a:solidFill>
-                <a:latin typeface="Open Sans SemiBold"/>
-                <a:ea typeface="Open Sans SemiBold"/>
-                <a:cs typeface="Open Sans SemiBold"/>
-                <a:sym typeface="Open Sans SemiBold"/>
-              </a:rPr>
-              <a:t>Bill Shirey</a:t>
-            </a:r>
-            <a:endParaRPr sz="1400" b="0" i="0" u="none" strike="noStrike" cap="none">
-              <a:solidFill>
-                <a:srgbClr val="000000"/>
-              </a:solidFill>
-              <a:latin typeface="Open Sans SemiBold"/>
-              <a:ea typeface="Open Sans SemiBold"/>
-              <a:cs typeface="Open Sans SemiBold"/>
-              <a:sym typeface="Open Sans SemiBold"/>
-            </a:endParaRPr>
-          </a:p>
-          <a:p>
-            <a:pPr marL="0" marR="0" lvl="0" indent="0" algn="ctr" rtl="0">
-              <a:lnSpc>
-                <a:spcPct val="100000"/>
-              </a:lnSpc>
-              <a:spcBef>
-                <a:spcPts val="0"/>
-              </a:spcBef>
-              <a:spcAft>
-                <a:spcPts val="0"/>
-              </a:spcAft>
-              <a:buClr>
-                <a:srgbClr val="000000"/>
-              </a:buClr>
-              <a:buSzPts val="1400"/>
-              <a:buFont typeface="Open Sans"/>
-              <a:buNone/>
-            </a:pPr>
-            <a:r>
-              <a:rPr lang="en" sz="1400" b="0" i="0" u="none" strike="noStrike" cap="none">
-                <a:solidFill>
-                  <a:srgbClr val="000000"/>
-                </a:solidFill>
-                <a:latin typeface="Open Sans"/>
-                <a:ea typeface="Open Sans"/>
-                <a:cs typeface="Open Sans"/>
-                <a:sym typeface="Open Sans"/>
-              </a:rPr>
-              <a:t>Department of Biomedical Informatics (DBMI)</a:t>
-            </a:r>
-            <a:endParaRPr sz="1400" b="0" i="0" u="none" strike="noStrike" cap="none">
-              <a:solidFill>
-                <a:srgbClr val="000000"/>
-              </a:solidFill>
-              <a:latin typeface="Open Sans"/>
-              <a:ea typeface="Open Sans"/>
-              <a:cs typeface="Open Sans"/>
-              <a:sym typeface="Open Sans"/>
-            </a:endParaRPr>
-          </a:p>
-          <a:p>
-            <a:pPr marL="0" marR="0" lvl="0" indent="0" algn="ctr" rtl="0">
-              <a:lnSpc>
-                <a:spcPct val="100000"/>
-              </a:lnSpc>
-              <a:spcBef>
-                <a:spcPts val="0"/>
-              </a:spcBef>
-              <a:spcAft>
-                <a:spcPts val="0"/>
-              </a:spcAft>
-              <a:buClr>
-                <a:srgbClr val="000000"/>
-              </a:buClr>
-              <a:buSzPts val="1400"/>
-              <a:buFont typeface="Open Sans"/>
-              <a:buNone/>
-            </a:pPr>
-            <a:r>
-              <a:rPr lang="en" sz="1400" b="0" i="0" u="none" strike="noStrike" cap="none">
-                <a:solidFill>
-                  <a:srgbClr val="000000"/>
-                </a:solidFill>
-                <a:latin typeface="Open Sans"/>
-                <a:ea typeface="Open Sans"/>
-                <a:cs typeface="Open Sans"/>
-                <a:sym typeface="Open Sans"/>
-              </a:rPr>
-              <a:t>University of Pittsburgh</a:t>
-            </a:r>
-            <a:endParaRPr sz="1400" b="0" i="0" u="none" strike="noStrike" cap="none">
-              <a:solidFill>
-                <a:srgbClr val="000000"/>
               </a:solidFill>
               <a:latin typeface="Open Sans"/>
               <a:ea typeface="Open Sans"/>
@@ -18855,7 +18613,7 @@
         </p:blipFill>
         <p:spPr>
           <a:xfrm>
-            <a:off x="362851" y="1104675"/>
+            <a:off x="0" y="1138106"/>
             <a:ext cx="1430850" cy="3693025"/>
           </a:xfrm>
           <a:prstGeom prst="rect">
@@ -18867,38 +18625,6 @@
           </a:ln>
         </p:spPr>
       </p:pic>
-      <p:sp>
-        <p:nvSpPr>
-          <p:cNvPr id="3" name="TextBox 2">
-            <a:extLst>
-              <a:ext uri="{FF2B5EF4-FFF2-40B4-BE49-F238E27FC236}">
-                <a16:creationId xmlns:a16="http://schemas.microsoft.com/office/drawing/2014/main" id="{22384AC6-417A-998A-336C-34E9F1F23D94}"/>
-              </a:ext>
-            </a:extLst>
-          </p:cNvPr>
-          <p:cNvSpPr txBox="1"/>
-          <p:nvPr/>
-        </p:nvSpPr>
-        <p:spPr>
-          <a:xfrm>
-            <a:off x="6525491" y="374073"/>
-            <a:ext cx="184731" cy="307777"/>
-          </a:xfrm>
-          <a:prstGeom prst="rect">
-            <a:avLst/>
-          </a:prstGeom>
-          <a:noFill/>
-        </p:spPr>
-        <p:txBody>
-          <a:bodyPr wrap="none" rtlCol="0">
-            <a:spAutoFit/>
-          </a:bodyPr>
-          <a:lstStyle/>
-          <a:p>
-            <a:endParaRPr lang="en-US" dirty="0"/>
-          </a:p>
-        </p:txBody>
-      </p:sp>
     </p:spTree>
   </p:cSld>
   <p:clrMapOvr>
@@ -18967,10 +18693,14 @@
               <a:buNone/>
             </a:pPr>
             <a:r>
-              <a:rPr lang="en" b="1"/>
-              <a:t>Agenda</a:t>
+              <a:rPr lang="en" b="1" dirty="0">
+                <a:latin typeface=""/>
+              </a:rPr>
+              <a:t>Overview</a:t>
             </a:r>
-            <a:endParaRPr b="1"/>
+            <a:endParaRPr b="1" dirty="0">
+              <a:latin typeface=""/>
+            </a:endParaRPr>
           </a:p>
         </p:txBody>
       </p:sp>
@@ -19003,7 +18733,7 @@
           </a:bodyPr>
           <a:lstStyle/>
           <a:p>
-            <a:pPr marL="457200" lvl="0" indent="-317500" algn="l" rtl="0">
+            <a:pPr lvl="0" algn="l" rtl="0">
               <a:lnSpc>
                 <a:spcPct val="150000"/>
               </a:lnSpc>
@@ -19014,23 +18744,42 @@
                 <a:spcPts val="0"/>
               </a:spcAft>
               <a:buSzPts val="1400"/>
-              <a:buChar char="●"/>
+              <a:buFont typeface="Arial" panose="020B0604020202020204" pitchFamily="34" charset="0"/>
+              <a:buChar char="•"/>
             </a:pPr>
             <a:r>
-              <a:rPr lang="en" sz="2000" dirty="0">
+              <a:rPr lang="en" sz="1800" dirty="0">
                 <a:solidFill>
                   <a:srgbClr val="000000"/>
                 </a:solidFill>
-                <a:latin typeface="Inter"/>
-                <a:ea typeface="Inter"/>
-                <a:cs typeface="Inter"/>
+                <a:latin typeface=""/>
                 <a:sym typeface="Inter"/>
               </a:rPr>
-              <a:t>Welcome, Background of HubMap (~2)</a:t>
+              <a:t>Outline, Background of </a:t>
+            </a:r>
+            <a:r>
+              <a:rPr lang="en" sz="1800" dirty="0" err="1">
+                <a:solidFill>
+                  <a:srgbClr val="000000"/>
+                </a:solidFill>
+                <a:latin typeface=""/>
+                <a:sym typeface="Inter"/>
+              </a:rPr>
+              <a:t>HubMap</a:t>
+            </a:r>
+            <a:r>
+              <a:rPr lang="en" sz="1800" dirty="0">
+                <a:solidFill>
+                  <a:srgbClr val="000000"/>
+                </a:solidFill>
+                <a:latin typeface=""/>
+                <a:sym typeface="Inter"/>
+              </a:rPr>
+              <a:t> (or PSC/Ruffalo lab?) (~2)</a:t>
             </a:r>
           </a:p>
           <a:p>
-            <a:pPr marL="457200" lvl="0" indent="-317500" algn="l" rtl="0">
+            <a:pPr lvl="0" algn="l" rtl="0">
               <a:lnSpc>
                 <a:spcPct val="150000"/>
               </a:lnSpc>
@@ -19041,19 +18790,21 @@
                 <a:spcPts val="0"/>
               </a:spcAft>
               <a:buSzPts val="1400"/>
-              <a:buChar char="●"/>
+              <a:buFont typeface="Arial" panose="020B0604020202020204" pitchFamily="34" charset="0"/>
+              <a:buChar char="•"/>
             </a:pPr>
             <a:r>
-              <a:rPr lang="en" sz="2000" dirty="0">
+              <a:rPr lang="en" sz="1800" dirty="0">
                 <a:solidFill>
                   <a:srgbClr val="000000"/>
                 </a:solidFill>
+                <a:latin typeface=""/>
               </a:rPr>
               <a:t>Quick tour of HuBMAP Consortium Portal (~2)</a:t>
             </a:r>
           </a:p>
           <a:p>
-            <a:pPr marL="457200" lvl="0" indent="-317500" algn="l" rtl="0">
+            <a:pPr lvl="0" algn="l" rtl="0">
               <a:lnSpc>
                 <a:spcPct val="150000"/>
               </a:lnSpc>
@@ -19064,48 +18815,41 @@
                 <a:spcPts val="0"/>
               </a:spcAft>
               <a:buSzPts val="1400"/>
-              <a:buChar char="●"/>
+              <a:buFont typeface="Arial" panose="020B0604020202020204" pitchFamily="34" charset="0"/>
+              <a:buChar char="•"/>
             </a:pPr>
             <a:r>
-              <a:rPr lang="en" sz="2000" dirty="0">
+              <a:rPr lang="en" sz="1800" dirty="0">
                 <a:solidFill>
                   <a:srgbClr val="000000"/>
                 </a:solidFill>
+                <a:latin typeface=""/>
               </a:rPr>
               <a:t>Data processing pipeline (~2 Penny on scRNAseq, one workflow, one on results?)</a:t>
             </a:r>
-            <a:endParaRPr sz="2000" dirty="0">
+          </a:p>
+          <a:p>
+            <a:pPr>
+              <a:lnSpc>
+                <a:spcPct val="150000"/>
+              </a:lnSpc>
+              <a:buFont typeface="Arial" panose="020B0604020202020204" pitchFamily="34" charset="0"/>
+              <a:buChar char="•"/>
+            </a:pPr>
+            <a:r>
+              <a:rPr lang="en" sz="1800" dirty="0">
+                <a:solidFill>
+                  <a:srgbClr val="000000"/>
+                </a:solidFill>
+                <a:latin typeface=""/>
+              </a:rPr>
+              <a:t>User interface</a:t>
+            </a:r>
+            <a:endParaRPr sz="1800" dirty="0">
               <a:solidFill>
                 <a:srgbClr val="000000"/>
               </a:solidFill>
-            </a:endParaRPr>
-          </a:p>
-          <a:p>
-            <a:pPr marL="457200" lvl="0" indent="-317500" algn="l" rtl="0">
-              <a:lnSpc>
-                <a:spcPct val="150000"/>
-              </a:lnSpc>
-              <a:spcBef>
-                <a:spcPts val="0"/>
-              </a:spcBef>
-              <a:spcAft>
-                <a:spcPts val="0"/>
-              </a:spcAft>
-              <a:buSzPts val="1400"/>
-              <a:buChar char="●"/>
-            </a:pPr>
-            <a:r>
-              <a:rPr lang="en-US" sz="1000" dirty="0">
-                <a:solidFill>
-                  <a:srgbClr val="454545"/>
-                </a:solidFill>
-              </a:rPr>
-              <a:t>TBD</a:t>
-            </a:r>
-            <a:endParaRPr sz="1000" dirty="0">
-              <a:solidFill>
-                <a:srgbClr val="454545"/>
-              </a:solidFill>
+              <a:latin typeface=""/>
             </a:endParaRPr>
           </a:p>
         </p:txBody>
@@ -19236,10 +18980,10 @@
               <a:buNone/>
             </a:pPr>
             <a:r>
-              <a:rPr lang="en"/>
+              <a:rPr lang="en" dirty="0"/>
               <a:t>Outline</a:t>
             </a:r>
-            <a:endParaRPr/>
+            <a:endParaRPr dirty="0"/>
           </a:p>
         </p:txBody>
       </p:sp>
@@ -19256,7 +19000,7 @@
         <p:spPr>
           <a:xfrm>
             <a:off x="285750" y="876300"/>
-            <a:ext cx="8714400" cy="3600600"/>
+            <a:ext cx="8714400" cy="3863866"/>
           </a:xfrm>
           <a:prstGeom prst="rect">
             <a:avLst/>
@@ -19272,20 +19016,174 @@
           </a:bodyPr>
           <a:lstStyle/>
           <a:p>
-            <a:pPr marL="0" lvl="0" indent="0" algn="l" rtl="0">
-              <a:lnSpc>
-                <a:spcPct val="100000"/>
-              </a:lnSpc>
-              <a:spcBef>
-                <a:spcPts val="450"/>
-              </a:spcBef>
-              <a:spcAft>
-                <a:spcPts val="0"/>
-              </a:spcAft>
-              <a:buSzPts val="2000"/>
-              <a:buNone/>
+            <a:pPr marL="342900" indent="-342900">
+              <a:buFont typeface="Arial" panose="020B0604020202020204" pitchFamily="34" charset="0"/>
+              <a:buChar char="•"/>
             </a:pPr>
-            <a:endParaRPr dirty="0"/>
+            <a:r>
+              <a:rPr lang="en-US" sz="1800" dirty="0">
+                <a:solidFill>
+                  <a:schemeClr val="bg2"/>
+                </a:solidFill>
+              </a:rPr>
+              <a:t>Pittsburgh Supercomputing Center (PSC) - Joint center of Carnegie Mellon &amp; University of Pittsburgh, providing advanced high performance computer resources for interdisciplinary research.</a:t>
+            </a:r>
+          </a:p>
+          <a:p>
+            <a:pPr marL="342900" indent="-342900">
+              <a:buFont typeface="Arial" panose="020B0604020202020204" pitchFamily="34" charset="0"/>
+              <a:buChar char="•"/>
+            </a:pPr>
+            <a:r>
+              <a:rPr lang="en-US" sz="1800" dirty="0" err="1">
+                <a:solidFill>
+                  <a:schemeClr val="bg2"/>
+                </a:solidFill>
+              </a:rPr>
+              <a:t>HuBMAP</a:t>
+            </a:r>
+            <a:r>
+              <a:rPr lang="en-US" sz="1800" dirty="0">
+                <a:solidFill>
+                  <a:schemeClr val="bg2"/>
+                </a:solidFill>
+              </a:rPr>
+              <a:t> Tool Development – Developed pipelines for standardized processing of </a:t>
+            </a:r>
+            <a:r>
+              <a:rPr lang="en-US" sz="1800" dirty="0" err="1">
+                <a:solidFill>
+                  <a:schemeClr val="bg2"/>
+                </a:solidFill>
+              </a:rPr>
+              <a:t>HuBMAP</a:t>
+            </a:r>
+            <a:r>
+              <a:rPr lang="en-US" sz="1800" dirty="0">
+                <a:solidFill>
+                  <a:schemeClr val="bg2"/>
+                </a:solidFill>
+              </a:rPr>
+              <a:t> data:</a:t>
+            </a:r>
+          </a:p>
+          <a:p>
+            <a:pPr marL="800100" lvl="1" indent="-342900">
+              <a:buFont typeface="Arial" panose="020B0604020202020204" pitchFamily="34" charset="0"/>
+              <a:buChar char="•"/>
+            </a:pPr>
+            <a:r>
+              <a:rPr lang="en-US" sz="1800" dirty="0">
+                <a:solidFill>
+                  <a:schemeClr val="bg2"/>
+                </a:solidFill>
+              </a:rPr>
+              <a:t>Single-cell sequencing (</a:t>
+            </a:r>
+            <a:r>
+              <a:rPr lang="en-US" sz="1800" dirty="0" err="1">
+                <a:solidFill>
+                  <a:schemeClr val="bg2"/>
+                </a:solidFill>
+              </a:rPr>
+              <a:t>scRNA</a:t>
+            </a:r>
+            <a:r>
+              <a:rPr lang="en-US" sz="1800" dirty="0">
+                <a:solidFill>
+                  <a:schemeClr val="bg2"/>
+                </a:solidFill>
+              </a:rPr>
+              <a:t>-seq, ATAC-seq)</a:t>
+            </a:r>
+          </a:p>
+          <a:p>
+            <a:pPr marL="800100" lvl="1" indent="-342900">
+              <a:buFont typeface="Arial" panose="020B0604020202020204" pitchFamily="34" charset="0"/>
+              <a:buChar char="•"/>
+            </a:pPr>
+            <a:r>
+              <a:rPr lang="en-US" sz="1800" dirty="0">
+                <a:solidFill>
+                  <a:schemeClr val="bg2"/>
+                </a:solidFill>
+              </a:rPr>
+              <a:t>Imaging data (segmentation, stitching)</a:t>
+            </a:r>
+          </a:p>
+          <a:p>
+            <a:pPr marL="800100" lvl="1" indent="-342900">
+              <a:buFont typeface="Arial" panose="020B0604020202020204" pitchFamily="34" charset="0"/>
+              <a:buChar char="•"/>
+            </a:pPr>
+            <a:r>
+              <a:rPr lang="en-US" sz="1800" dirty="0">
+                <a:solidFill>
+                  <a:schemeClr val="bg2"/>
+                </a:solidFill>
+              </a:rPr>
+              <a:t>Spatial transcriptomics/proteomics (CODEX, </a:t>
+            </a:r>
+            <a:r>
+              <a:rPr lang="en-US" sz="1800" dirty="0" err="1">
+                <a:solidFill>
+                  <a:schemeClr val="bg2"/>
+                </a:solidFill>
+              </a:rPr>
+              <a:t>seqFISH</a:t>
+            </a:r>
+            <a:r>
+              <a:rPr lang="en-US" sz="1800" dirty="0">
+                <a:solidFill>
+                  <a:schemeClr val="bg2"/>
+                </a:solidFill>
+              </a:rPr>
+              <a:t>)</a:t>
+            </a:r>
+          </a:p>
+          <a:p>
+            <a:pPr marL="800100" lvl="1" indent="-342900">
+              <a:buFont typeface="Arial" panose="020B0604020202020204" pitchFamily="34" charset="0"/>
+              <a:buChar char="•"/>
+            </a:pPr>
+            <a:r>
+              <a:rPr lang="en-US" sz="1800" dirty="0">
+                <a:solidFill>
+                  <a:schemeClr val="bg2"/>
+                </a:solidFill>
+              </a:rPr>
+              <a:t>Downstream analysis of image-based data</a:t>
+            </a:r>
+          </a:p>
+          <a:p>
+            <a:pPr marL="342900" indent="-342900">
+              <a:buFont typeface="Arial" panose="020B0604020202020204" pitchFamily="34" charset="0"/>
+              <a:buChar char="•"/>
+            </a:pPr>
+            <a:r>
+              <a:rPr lang="en-US" sz="1800" dirty="0">
+                <a:solidFill>
+                  <a:schemeClr val="bg2"/>
+                </a:solidFill>
+              </a:rPr>
+              <a:t>All tools created are publicly available and integrated into the </a:t>
+            </a:r>
+            <a:r>
+              <a:rPr lang="en-US" sz="1800" dirty="0" err="1">
+                <a:solidFill>
+                  <a:schemeClr val="bg2"/>
+                </a:solidFill>
+              </a:rPr>
+              <a:t>HuBMAP</a:t>
+            </a:r>
+            <a:r>
+              <a:rPr lang="en-US" sz="1800" dirty="0">
+                <a:solidFill>
+                  <a:schemeClr val="bg2"/>
+                </a:solidFill>
+              </a:rPr>
+              <a:t> website, providing a user-friendly interface to interact with complex biological data. </a:t>
+            </a:r>
           </a:p>
         </p:txBody>
       </p:sp>
@@ -19298,6 +19196,1066 @@
 </file>
 
 <file path=ppt/slides/slide4.xml><?xml version="1.0" encoding="utf-8"?>
+<p:sld xmlns:a="http://schemas.openxmlformats.org/drawingml/2006/main" xmlns:r="http://schemas.openxmlformats.org/officeDocument/2006/relationships" xmlns:p="http://schemas.openxmlformats.org/presentationml/2006/main">
+  <p:cSld>
+    <p:spTree>
+      <p:nvGrpSpPr>
+        <p:cNvPr id="1" name=""/>
+        <p:cNvGrpSpPr/>
+        <p:nvPr/>
+      </p:nvGrpSpPr>
+      <p:grpSpPr>
+        <a:xfrm>
+          <a:off x="0" y="0"/>
+          <a:ext cx="0" cy="0"/>
+          <a:chOff x="0" y="0"/>
+          <a:chExt cx="0" cy="0"/>
+        </a:xfrm>
+      </p:grpSpPr>
+      <p:sp>
+        <p:nvSpPr>
+          <p:cNvPr id="2" name="Title 1">
+            <a:extLst>
+              <a:ext uri="{FF2B5EF4-FFF2-40B4-BE49-F238E27FC236}">
+                <a16:creationId xmlns:a16="http://schemas.microsoft.com/office/drawing/2014/main" id="{4A3FDEF0-0E9E-89FE-9528-247524E878CD}"/>
+              </a:ext>
+            </a:extLst>
+          </p:cNvPr>
+          <p:cNvSpPr>
+            <a:spLocks noGrp="1"/>
+          </p:cNvSpPr>
+          <p:nvPr>
+            <p:ph type="title"/>
+          </p:nvPr>
+        </p:nvSpPr>
+        <p:spPr/>
+        <p:txBody>
+          <a:bodyPr/>
+          <a:lstStyle/>
+          <a:p>
+            <a:r>
+              <a:rPr lang="en-US" dirty="0" err="1"/>
+              <a:t>HuBMAP</a:t>
+            </a:r>
+            <a:r>
+              <a:rPr lang="en-US" dirty="0"/>
+              <a:t> Consortium Portal</a:t>
+            </a:r>
+          </a:p>
+        </p:txBody>
+      </p:sp>
+      <p:sp>
+        <p:nvSpPr>
+          <p:cNvPr id="3" name="Text Placeholder 2">
+            <a:extLst>
+              <a:ext uri="{FF2B5EF4-FFF2-40B4-BE49-F238E27FC236}">
+                <a16:creationId xmlns:a16="http://schemas.microsoft.com/office/drawing/2014/main" id="{07280EE4-E715-5681-6C0A-83D95BE98641}"/>
+              </a:ext>
+            </a:extLst>
+          </p:cNvPr>
+          <p:cNvSpPr>
+            <a:spLocks noGrp="1"/>
+          </p:cNvSpPr>
+          <p:nvPr>
+            <p:ph type="body" idx="1"/>
+          </p:nvPr>
+        </p:nvSpPr>
+        <p:spPr/>
+        <p:txBody>
+          <a:bodyPr/>
+          <a:lstStyle/>
+          <a:p>
+            <a:endParaRPr lang="en-US" dirty="0"/>
+          </a:p>
+        </p:txBody>
+      </p:sp>
+    </p:spTree>
+    <p:extLst>
+      <p:ext uri="{BB962C8B-B14F-4D97-AF65-F5344CB8AC3E}">
+        <p14:creationId xmlns:p14="http://schemas.microsoft.com/office/powerpoint/2010/main" val="3295762385"/>
+      </p:ext>
+    </p:extLst>
+  </p:cSld>
+  <p:clrMapOvr>
+    <a:masterClrMapping/>
+  </p:clrMapOvr>
+</p:sld>
+</file>
+
+<file path=ppt/slides/slide5.xml><?xml version="1.0" encoding="utf-8"?>
+<p:sld xmlns:a="http://schemas.openxmlformats.org/drawingml/2006/main" xmlns:r="http://schemas.openxmlformats.org/officeDocument/2006/relationships" xmlns:p="http://schemas.openxmlformats.org/presentationml/2006/main">
+  <p:cSld>
+    <p:spTree>
+      <p:nvGrpSpPr>
+        <p:cNvPr id="1" name=""/>
+        <p:cNvGrpSpPr/>
+        <p:nvPr/>
+      </p:nvGrpSpPr>
+      <p:grpSpPr>
+        <a:xfrm>
+          <a:off x="0" y="0"/>
+          <a:ext cx="0" cy="0"/>
+          <a:chOff x="0" y="0"/>
+          <a:chExt cx="0" cy="0"/>
+        </a:xfrm>
+      </p:grpSpPr>
+      <p:sp>
+        <p:nvSpPr>
+          <p:cNvPr id="2" name="Title 1">
+            <a:extLst>
+              <a:ext uri="{FF2B5EF4-FFF2-40B4-BE49-F238E27FC236}">
+                <a16:creationId xmlns:a16="http://schemas.microsoft.com/office/drawing/2014/main" id="{2CDC81F9-028C-E2EC-772C-06B234652CC6}"/>
+              </a:ext>
+            </a:extLst>
+          </p:cNvPr>
+          <p:cNvSpPr>
+            <a:spLocks noGrp="1"/>
+          </p:cNvSpPr>
+          <p:nvPr>
+            <p:ph type="title"/>
+          </p:nvPr>
+        </p:nvSpPr>
+        <p:spPr>
+          <a:xfrm>
+            <a:off x="11150" y="6545"/>
+            <a:ext cx="9144000" cy="601500"/>
+          </a:xfrm>
+        </p:spPr>
+        <p:txBody>
+          <a:bodyPr/>
+          <a:lstStyle/>
+          <a:p>
+            <a:r>
+              <a:rPr lang="en-US" dirty="0"/>
+              <a:t>Raw Heart Data - </a:t>
+            </a:r>
+            <a:r>
+              <a:rPr lang="en-US" dirty="0" err="1"/>
+              <a:t>scRNAseq</a:t>
+            </a:r>
+            <a:endParaRPr lang="en-US" dirty="0"/>
+          </a:p>
+        </p:txBody>
+      </p:sp>
+      <p:sp>
+        <p:nvSpPr>
+          <p:cNvPr id="6" name="Rectangle 5">
+            <a:extLst>
+              <a:ext uri="{FF2B5EF4-FFF2-40B4-BE49-F238E27FC236}">
+                <a16:creationId xmlns:a16="http://schemas.microsoft.com/office/drawing/2014/main" id="{3C6C64C8-C76C-B86B-D5DD-AEBEAF017869}"/>
+              </a:ext>
+            </a:extLst>
+          </p:cNvPr>
+          <p:cNvSpPr/>
+          <p:nvPr/>
+        </p:nvSpPr>
+        <p:spPr>
+          <a:xfrm>
+            <a:off x="90272" y="765371"/>
+            <a:ext cx="4329715" cy="1333848"/>
+          </a:xfrm>
+          <a:prstGeom prst="rect">
+            <a:avLst/>
+          </a:prstGeom>
+        </p:spPr>
+        <p:style>
+          <a:lnRef idx="2">
+            <a:schemeClr val="accent1">
+              <a:shade val="15000"/>
+            </a:schemeClr>
+          </a:lnRef>
+          <a:fillRef idx="1">
+            <a:schemeClr val="accent1"/>
+          </a:fillRef>
+          <a:effectRef idx="0">
+            <a:schemeClr val="accent1"/>
+          </a:effectRef>
+          <a:fontRef idx="minor">
+            <a:schemeClr val="lt1"/>
+          </a:fontRef>
+        </p:style>
+        <p:txBody>
+          <a:bodyPr rtlCol="0" anchor="ctr"/>
+          <a:lstStyle/>
+          <a:p>
+            <a:pPr algn="ctr"/>
+            <a:endParaRPr lang="en-US">
+              <a:solidFill>
+                <a:schemeClr val="bg2"/>
+              </a:solidFill>
+            </a:endParaRPr>
+          </a:p>
+        </p:txBody>
+      </p:sp>
+      <p:sp>
+        <p:nvSpPr>
+          <p:cNvPr id="17" name="Rectangle 16">
+            <a:extLst>
+              <a:ext uri="{FF2B5EF4-FFF2-40B4-BE49-F238E27FC236}">
+                <a16:creationId xmlns:a16="http://schemas.microsoft.com/office/drawing/2014/main" id="{3C746E78-4921-1425-1910-B448A9B74A93}"/>
+              </a:ext>
+            </a:extLst>
+          </p:cNvPr>
+          <p:cNvSpPr/>
+          <p:nvPr/>
+        </p:nvSpPr>
+        <p:spPr>
+          <a:xfrm>
+            <a:off x="90273" y="2196445"/>
+            <a:ext cx="4329714" cy="2587178"/>
+          </a:xfrm>
+          <a:prstGeom prst="rect">
+            <a:avLst/>
+          </a:prstGeom>
+        </p:spPr>
+        <p:style>
+          <a:lnRef idx="2">
+            <a:schemeClr val="accent1">
+              <a:shade val="15000"/>
+            </a:schemeClr>
+          </a:lnRef>
+          <a:fillRef idx="1">
+            <a:schemeClr val="accent1"/>
+          </a:fillRef>
+          <a:effectRef idx="0">
+            <a:schemeClr val="accent1"/>
+          </a:effectRef>
+          <a:fontRef idx="minor">
+            <a:schemeClr val="lt1"/>
+          </a:fontRef>
+        </p:style>
+        <p:txBody>
+          <a:bodyPr rtlCol="0" anchor="ctr"/>
+          <a:lstStyle/>
+          <a:p>
+            <a:pPr algn="ctr"/>
+            <a:endParaRPr lang="en-US"/>
+          </a:p>
+        </p:txBody>
+      </p:sp>
+      <p:pic>
+        <p:nvPicPr>
+          <p:cNvPr id="5" name="Picture 4" descr="A screenshot of a computer&#10;&#10;AI-generated content may be incorrect.">
+            <a:extLst>
+              <a:ext uri="{FF2B5EF4-FFF2-40B4-BE49-F238E27FC236}">
+                <a16:creationId xmlns:a16="http://schemas.microsoft.com/office/drawing/2014/main" id="{5C8C8665-D41C-8027-0B8D-5FF21F99ECFC}"/>
+              </a:ext>
+            </a:extLst>
+          </p:cNvPr>
+          <p:cNvPicPr>
+            <a:picLocks noChangeAspect="1"/>
+          </p:cNvPicPr>
+          <p:nvPr/>
+        </p:nvPicPr>
+        <p:blipFill>
+          <a:blip r:embed="rId2"/>
+          <a:stretch>
+            <a:fillRect/>
+          </a:stretch>
+        </p:blipFill>
+        <p:spPr>
+          <a:xfrm>
+            <a:off x="159316" y="845825"/>
+            <a:ext cx="4172394" cy="1107167"/>
+          </a:xfrm>
+          <a:prstGeom prst="rect">
+            <a:avLst/>
+          </a:prstGeom>
+        </p:spPr>
+      </p:pic>
+      <p:pic>
+        <p:nvPicPr>
+          <p:cNvPr id="15" name="Picture 14" descr="A screen shot of a computer&#10;&#10;AI-generated content may be incorrect.">
+            <a:extLst>
+              <a:ext uri="{FF2B5EF4-FFF2-40B4-BE49-F238E27FC236}">
+                <a16:creationId xmlns:a16="http://schemas.microsoft.com/office/drawing/2014/main" id="{14AF36DA-ED82-58D2-AA11-3FE1A565CA18}"/>
+              </a:ext>
+            </a:extLst>
+          </p:cNvPr>
+          <p:cNvPicPr>
+            <a:picLocks noChangeAspect="1"/>
+          </p:cNvPicPr>
+          <p:nvPr/>
+        </p:nvPicPr>
+        <p:blipFill>
+          <a:blip r:embed="rId3"/>
+          <a:stretch>
+            <a:fillRect/>
+          </a:stretch>
+        </p:blipFill>
+        <p:spPr>
+          <a:xfrm>
+            <a:off x="2001959" y="2477793"/>
+            <a:ext cx="2106064" cy="2039939"/>
+          </a:xfrm>
+          <a:prstGeom prst="rect">
+            <a:avLst/>
+          </a:prstGeom>
+        </p:spPr>
+      </p:pic>
+      <p:pic>
+        <p:nvPicPr>
+          <p:cNvPr id="13" name="Picture 12" descr="A screenshot of a computer screen&#10;&#10;AI-generated content may be incorrect.">
+            <a:extLst>
+              <a:ext uri="{FF2B5EF4-FFF2-40B4-BE49-F238E27FC236}">
+                <a16:creationId xmlns:a16="http://schemas.microsoft.com/office/drawing/2014/main" id="{BBD5B26C-B633-C406-0CBF-C2B7ED6B7291}"/>
+              </a:ext>
+            </a:extLst>
+          </p:cNvPr>
+          <p:cNvPicPr>
+            <a:picLocks noChangeAspect="1"/>
+          </p:cNvPicPr>
+          <p:nvPr/>
+        </p:nvPicPr>
+        <p:blipFill>
+          <a:blip r:embed="rId4"/>
+          <a:stretch>
+            <a:fillRect/>
+          </a:stretch>
+        </p:blipFill>
+        <p:spPr>
+          <a:xfrm>
+            <a:off x="214790" y="2327967"/>
+            <a:ext cx="1721935" cy="2350273"/>
+          </a:xfrm>
+          <a:prstGeom prst="rect">
+            <a:avLst/>
+          </a:prstGeom>
+        </p:spPr>
+      </p:pic>
+      <p:sp>
+        <p:nvSpPr>
+          <p:cNvPr id="18" name="TextBox 17">
+            <a:extLst>
+              <a:ext uri="{FF2B5EF4-FFF2-40B4-BE49-F238E27FC236}">
+                <a16:creationId xmlns:a16="http://schemas.microsoft.com/office/drawing/2014/main" id="{5CDAA9CD-711E-916B-229E-617491AB576A}"/>
+              </a:ext>
+            </a:extLst>
+          </p:cNvPr>
+          <p:cNvSpPr txBox="1"/>
+          <p:nvPr/>
+        </p:nvSpPr>
+        <p:spPr>
+          <a:xfrm>
+            <a:off x="4398745" y="767525"/>
+            <a:ext cx="4514249" cy="1384995"/>
+          </a:xfrm>
+          <a:prstGeom prst="rect">
+            <a:avLst/>
+          </a:prstGeom>
+          <a:noFill/>
+        </p:spPr>
+        <p:txBody>
+          <a:bodyPr wrap="square" rtlCol="0">
+            <a:spAutoFit/>
+          </a:bodyPr>
+          <a:lstStyle/>
+          <a:p>
+            <a:pPr marL="285750" indent="-285750">
+              <a:buFont typeface="Arial" panose="020B0604020202020204" pitchFamily="34" charset="0"/>
+              <a:buChar char="•"/>
+            </a:pPr>
+            <a:r>
+              <a:rPr lang="en-US" dirty="0" err="1"/>
+              <a:t>AnnData</a:t>
+            </a:r>
+            <a:r>
+              <a:rPr lang="en-US" dirty="0"/>
+              <a:t> provides essential tools for interpreting and working with complex biological datasets.</a:t>
+            </a:r>
+          </a:p>
+          <a:p>
+            <a:pPr marL="285750" indent="-285750">
+              <a:buFont typeface="Arial" panose="020B0604020202020204" pitchFamily="34" charset="0"/>
+              <a:buChar char="•"/>
+            </a:pPr>
+            <a:r>
+              <a:rPr lang="en-US" dirty="0" err="1"/>
+              <a:t>HuBMAP</a:t>
+            </a:r>
+            <a:r>
+              <a:rPr lang="en-US" dirty="0"/>
+              <a:t> raw heart data was read using the </a:t>
+            </a:r>
+            <a:r>
+              <a:rPr lang="en-US" dirty="0" err="1"/>
+              <a:t>AnnData</a:t>
+            </a:r>
+            <a:r>
+              <a:rPr lang="en-US" dirty="0"/>
+              <a:t> Python package </a:t>
+            </a:r>
+          </a:p>
+          <a:p>
+            <a:pPr marL="285750" indent="-285750">
+              <a:buFont typeface="Arial" panose="020B0604020202020204" pitchFamily="34" charset="0"/>
+              <a:buChar char="•"/>
+            </a:pPr>
+            <a:r>
+              <a:rPr lang="en-US" dirty="0"/>
+              <a:t>Pre-processed data: cells(</a:t>
+            </a:r>
+            <a:r>
+              <a:rPr lang="en-US" dirty="0" err="1"/>
+              <a:t>n_obs</a:t>
+            </a:r>
+            <a:r>
+              <a:rPr lang="en-US" dirty="0"/>
+              <a:t>) x genes(</a:t>
+            </a:r>
+            <a:r>
+              <a:rPr lang="en-US" dirty="0" err="1"/>
+              <a:t>n_vars</a:t>
+            </a:r>
+            <a:r>
+              <a:rPr lang="en-US" dirty="0"/>
+              <a:t>) = </a:t>
+            </a:r>
+            <a:r>
+              <a:rPr lang="en-US" b="1" u="sng" dirty="0"/>
+              <a:t>117782 x 60286</a:t>
+            </a:r>
+          </a:p>
+        </p:txBody>
+      </p:sp>
+      <p:sp>
+        <p:nvSpPr>
+          <p:cNvPr id="19" name="TextBox 18">
+            <a:extLst>
+              <a:ext uri="{FF2B5EF4-FFF2-40B4-BE49-F238E27FC236}">
+                <a16:creationId xmlns:a16="http://schemas.microsoft.com/office/drawing/2014/main" id="{608BA8C8-A7B3-4F19-0D84-79E180C9E92F}"/>
+              </a:ext>
+            </a:extLst>
+          </p:cNvPr>
+          <p:cNvSpPr txBox="1"/>
+          <p:nvPr/>
+        </p:nvSpPr>
+        <p:spPr>
+          <a:xfrm>
+            <a:off x="4398745" y="2510769"/>
+            <a:ext cx="4675218" cy="1600438"/>
+          </a:xfrm>
+          <a:prstGeom prst="rect">
+            <a:avLst/>
+          </a:prstGeom>
+          <a:noFill/>
+        </p:spPr>
+        <p:txBody>
+          <a:bodyPr wrap="square" rtlCol="0">
+            <a:spAutoFit/>
+          </a:bodyPr>
+          <a:lstStyle/>
+          <a:p>
+            <a:pPr marL="285750" indent="-285750">
+              <a:buFont typeface="Arial" panose="020B0604020202020204" pitchFamily="34" charset="0"/>
+              <a:buChar char="•"/>
+            </a:pPr>
+            <a:r>
+              <a:rPr lang="en-US" dirty="0"/>
+              <a:t>The pandas library enables targeted analysis of specific data points. </a:t>
+            </a:r>
+          </a:p>
+          <a:p>
+            <a:pPr marL="285750" indent="-285750">
+              <a:buFont typeface="Arial" panose="020B0604020202020204" pitchFamily="34" charset="0"/>
+              <a:buChar char="•"/>
+            </a:pPr>
+            <a:r>
+              <a:rPr lang="en-US" dirty="0"/>
+              <a:t>We can summarize or visualize the distribution of cell or gene types by label. </a:t>
+            </a:r>
+          </a:p>
+          <a:p>
+            <a:pPr marL="285750" indent="-285750">
+              <a:buFont typeface="Arial" panose="020B0604020202020204" pitchFamily="34" charset="0"/>
+              <a:buChar char="•"/>
+            </a:pPr>
+            <a:r>
+              <a:rPr lang="en-US" dirty="0"/>
+              <a:t>Revealing the composition of cells and genes is helpful with comparison before and after pipeline processing</a:t>
+            </a:r>
+          </a:p>
+        </p:txBody>
+      </p:sp>
+    </p:spTree>
+    <p:extLst>
+      <p:ext uri="{BB962C8B-B14F-4D97-AF65-F5344CB8AC3E}">
+        <p14:creationId xmlns:p14="http://schemas.microsoft.com/office/powerpoint/2010/main" val="1635965244"/>
+      </p:ext>
+    </p:extLst>
+  </p:cSld>
+  <p:clrMapOvr>
+    <a:masterClrMapping/>
+  </p:clrMapOvr>
+</p:sld>
+</file>
+
+<file path=ppt/slides/slide6.xml><?xml version="1.0" encoding="utf-8"?>
+<p:sld xmlns:a="http://schemas.openxmlformats.org/drawingml/2006/main" xmlns:r="http://schemas.openxmlformats.org/officeDocument/2006/relationships" xmlns:p="http://schemas.openxmlformats.org/presentationml/2006/main">
+  <p:cSld>
+    <p:spTree>
+      <p:nvGrpSpPr>
+        <p:cNvPr id="1" name=""/>
+        <p:cNvGrpSpPr/>
+        <p:nvPr/>
+      </p:nvGrpSpPr>
+      <p:grpSpPr>
+        <a:xfrm>
+          <a:off x="0" y="0"/>
+          <a:ext cx="0" cy="0"/>
+          <a:chOff x="0" y="0"/>
+          <a:chExt cx="0" cy="0"/>
+        </a:xfrm>
+      </p:grpSpPr>
+      <p:sp>
+        <p:nvSpPr>
+          <p:cNvPr id="2" name="Title 1">
+            <a:extLst>
+              <a:ext uri="{FF2B5EF4-FFF2-40B4-BE49-F238E27FC236}">
+                <a16:creationId xmlns:a16="http://schemas.microsoft.com/office/drawing/2014/main" id="{9B679CFD-F975-8A6D-0633-A003838850EE}"/>
+              </a:ext>
+            </a:extLst>
+          </p:cNvPr>
+          <p:cNvSpPr>
+            <a:spLocks noGrp="1"/>
+          </p:cNvSpPr>
+          <p:nvPr>
+            <p:ph type="title"/>
+          </p:nvPr>
+        </p:nvSpPr>
+        <p:spPr/>
+        <p:txBody>
+          <a:bodyPr/>
+          <a:lstStyle/>
+          <a:p>
+            <a:r>
+              <a:rPr lang="en-US" dirty="0"/>
+              <a:t>Processed Heart Data – Pipeline Results </a:t>
+            </a:r>
+          </a:p>
+        </p:txBody>
+      </p:sp>
+      <p:sp>
+        <p:nvSpPr>
+          <p:cNvPr id="4" name="Rectangle 3">
+            <a:extLst>
+              <a:ext uri="{FF2B5EF4-FFF2-40B4-BE49-F238E27FC236}">
+                <a16:creationId xmlns:a16="http://schemas.microsoft.com/office/drawing/2014/main" id="{057EF5D1-0974-BD74-BAE3-9C7DFBAE3112}"/>
+              </a:ext>
+            </a:extLst>
+          </p:cNvPr>
+          <p:cNvSpPr/>
+          <p:nvPr/>
+        </p:nvSpPr>
+        <p:spPr>
+          <a:xfrm>
+            <a:off x="69502" y="695912"/>
+            <a:ext cx="4058362" cy="1103333"/>
+          </a:xfrm>
+          <a:prstGeom prst="rect">
+            <a:avLst/>
+          </a:prstGeom>
+        </p:spPr>
+        <p:style>
+          <a:lnRef idx="2">
+            <a:schemeClr val="accent1">
+              <a:shade val="15000"/>
+            </a:schemeClr>
+          </a:lnRef>
+          <a:fillRef idx="1">
+            <a:schemeClr val="accent1"/>
+          </a:fillRef>
+          <a:effectRef idx="0">
+            <a:schemeClr val="accent1"/>
+          </a:effectRef>
+          <a:fontRef idx="minor">
+            <a:schemeClr val="lt1"/>
+          </a:fontRef>
+        </p:style>
+        <p:txBody>
+          <a:bodyPr rtlCol="0" anchor="ctr"/>
+          <a:lstStyle/>
+          <a:p>
+            <a:pPr algn="ctr"/>
+            <a:endParaRPr lang="en-US">
+              <a:solidFill>
+                <a:schemeClr val="bg2"/>
+              </a:solidFill>
+            </a:endParaRPr>
+          </a:p>
+        </p:txBody>
+      </p:sp>
+      <p:sp>
+        <p:nvSpPr>
+          <p:cNvPr id="9" name="Rectangle 8">
+            <a:extLst>
+              <a:ext uri="{FF2B5EF4-FFF2-40B4-BE49-F238E27FC236}">
+                <a16:creationId xmlns:a16="http://schemas.microsoft.com/office/drawing/2014/main" id="{EB49BE27-3939-FFA1-4921-41B172AEE078}"/>
+              </a:ext>
+            </a:extLst>
+          </p:cNvPr>
+          <p:cNvSpPr/>
+          <p:nvPr/>
+        </p:nvSpPr>
+        <p:spPr>
+          <a:xfrm>
+            <a:off x="69502" y="2101462"/>
+            <a:ext cx="2948018" cy="2429692"/>
+          </a:xfrm>
+          <a:prstGeom prst="rect">
+            <a:avLst/>
+          </a:prstGeom>
+        </p:spPr>
+        <p:style>
+          <a:lnRef idx="2">
+            <a:schemeClr val="accent1">
+              <a:shade val="15000"/>
+            </a:schemeClr>
+          </a:lnRef>
+          <a:fillRef idx="1">
+            <a:schemeClr val="accent1"/>
+          </a:fillRef>
+          <a:effectRef idx="0">
+            <a:schemeClr val="accent1"/>
+          </a:effectRef>
+          <a:fontRef idx="minor">
+            <a:schemeClr val="lt1"/>
+          </a:fontRef>
+        </p:style>
+        <p:txBody>
+          <a:bodyPr rtlCol="0" anchor="ctr"/>
+          <a:lstStyle/>
+          <a:p>
+            <a:pPr algn="ctr"/>
+            <a:endParaRPr lang="en-US"/>
+          </a:p>
+        </p:txBody>
+      </p:sp>
+      <p:sp>
+        <p:nvSpPr>
+          <p:cNvPr id="14" name="Rectangle 13">
+            <a:extLst>
+              <a:ext uri="{FF2B5EF4-FFF2-40B4-BE49-F238E27FC236}">
+                <a16:creationId xmlns:a16="http://schemas.microsoft.com/office/drawing/2014/main" id="{335CC84C-E73B-84D9-DE95-250F9DB6AD98}"/>
+              </a:ext>
+            </a:extLst>
+          </p:cNvPr>
+          <p:cNvSpPr/>
+          <p:nvPr/>
+        </p:nvSpPr>
+        <p:spPr>
+          <a:xfrm>
+            <a:off x="3062887" y="2101462"/>
+            <a:ext cx="3005805" cy="2429693"/>
+          </a:xfrm>
+          <a:prstGeom prst="rect">
+            <a:avLst/>
+          </a:prstGeom>
+        </p:spPr>
+        <p:style>
+          <a:lnRef idx="2">
+            <a:schemeClr val="accent1">
+              <a:shade val="15000"/>
+            </a:schemeClr>
+          </a:lnRef>
+          <a:fillRef idx="1">
+            <a:schemeClr val="accent1"/>
+          </a:fillRef>
+          <a:effectRef idx="0">
+            <a:schemeClr val="accent1"/>
+          </a:effectRef>
+          <a:fontRef idx="minor">
+            <a:schemeClr val="lt1"/>
+          </a:fontRef>
+        </p:style>
+        <p:txBody>
+          <a:bodyPr rtlCol="0" anchor="ctr"/>
+          <a:lstStyle/>
+          <a:p>
+            <a:pPr algn="ctr"/>
+            <a:endParaRPr lang="en-US"/>
+          </a:p>
+        </p:txBody>
+      </p:sp>
+      <p:pic>
+        <p:nvPicPr>
+          <p:cNvPr id="6" name="Picture 5" descr="A screenshot of a computer&#10;&#10;AI-generated content may be incorrect.">
+            <a:extLst>
+              <a:ext uri="{FF2B5EF4-FFF2-40B4-BE49-F238E27FC236}">
+                <a16:creationId xmlns:a16="http://schemas.microsoft.com/office/drawing/2014/main" id="{B0ECB104-444A-6533-BF6D-3CD5EEBE72D2}"/>
+              </a:ext>
+            </a:extLst>
+          </p:cNvPr>
+          <p:cNvPicPr>
+            <a:picLocks noChangeAspect="1"/>
+          </p:cNvPicPr>
+          <p:nvPr/>
+        </p:nvPicPr>
+        <p:blipFill>
+          <a:blip r:embed="rId2"/>
+          <a:stretch>
+            <a:fillRect/>
+          </a:stretch>
+        </p:blipFill>
+        <p:spPr>
+          <a:xfrm>
+            <a:off x="114869" y="788437"/>
+            <a:ext cx="3972444" cy="907961"/>
+          </a:xfrm>
+          <a:prstGeom prst="rect">
+            <a:avLst/>
+          </a:prstGeom>
+        </p:spPr>
+      </p:pic>
+      <p:pic>
+        <p:nvPicPr>
+          <p:cNvPr id="8" name="Picture 7" descr="A screen shot of a computer&#10;&#10;AI-generated content may be incorrect.">
+            <a:extLst>
+              <a:ext uri="{FF2B5EF4-FFF2-40B4-BE49-F238E27FC236}">
+                <a16:creationId xmlns:a16="http://schemas.microsoft.com/office/drawing/2014/main" id="{CCDE5F52-C0EE-AA73-7FFC-7967D43A9C65}"/>
+              </a:ext>
+            </a:extLst>
+          </p:cNvPr>
+          <p:cNvPicPr>
+            <a:picLocks noChangeAspect="1"/>
+          </p:cNvPicPr>
+          <p:nvPr/>
+        </p:nvPicPr>
+        <p:blipFill>
+          <a:blip r:embed="rId3"/>
+          <a:stretch>
+            <a:fillRect/>
+          </a:stretch>
+        </p:blipFill>
+        <p:spPr>
+          <a:xfrm>
+            <a:off x="114869" y="2193545"/>
+            <a:ext cx="2837337" cy="2290489"/>
+          </a:xfrm>
+          <a:prstGeom prst="rect">
+            <a:avLst/>
+          </a:prstGeom>
+        </p:spPr>
+      </p:pic>
+      <p:pic>
+        <p:nvPicPr>
+          <p:cNvPr id="11" name="Picture 10" descr="A screenshot of a computer&#10;&#10;AI-generated content may be incorrect.">
+            <a:extLst>
+              <a:ext uri="{FF2B5EF4-FFF2-40B4-BE49-F238E27FC236}">
+                <a16:creationId xmlns:a16="http://schemas.microsoft.com/office/drawing/2014/main" id="{06398F55-D517-C99B-BF2A-2157979A3B2B}"/>
+              </a:ext>
+            </a:extLst>
+          </p:cNvPr>
+          <p:cNvPicPr>
+            <a:picLocks noChangeAspect="1"/>
+          </p:cNvPicPr>
+          <p:nvPr/>
+        </p:nvPicPr>
+        <p:blipFill>
+          <a:blip r:embed="rId4"/>
+          <a:stretch>
+            <a:fillRect/>
+          </a:stretch>
+        </p:blipFill>
+        <p:spPr>
+          <a:xfrm>
+            <a:off x="3373331" y="2489842"/>
+            <a:ext cx="2397336" cy="1994194"/>
+          </a:xfrm>
+          <a:prstGeom prst="rect">
+            <a:avLst/>
+          </a:prstGeom>
+        </p:spPr>
+      </p:pic>
+      <p:pic>
+        <p:nvPicPr>
+          <p:cNvPr id="13" name="Picture 12">
+            <a:extLst>
+              <a:ext uri="{FF2B5EF4-FFF2-40B4-BE49-F238E27FC236}">
+                <a16:creationId xmlns:a16="http://schemas.microsoft.com/office/drawing/2014/main" id="{F376AA01-7DA9-E380-374E-850022C6C3B0}"/>
+              </a:ext>
+            </a:extLst>
+          </p:cNvPr>
+          <p:cNvPicPr>
+            <a:picLocks noChangeAspect="1"/>
+          </p:cNvPicPr>
+          <p:nvPr/>
+        </p:nvPicPr>
+        <p:blipFill>
+          <a:blip r:embed="rId5"/>
+          <a:stretch>
+            <a:fillRect/>
+          </a:stretch>
+        </p:blipFill>
+        <p:spPr>
+          <a:xfrm>
+            <a:off x="3246377" y="2221633"/>
+            <a:ext cx="2651244" cy="274569"/>
+          </a:xfrm>
+          <a:prstGeom prst="rect">
+            <a:avLst/>
+          </a:prstGeom>
+        </p:spPr>
+      </p:pic>
+      <p:sp>
+        <p:nvSpPr>
+          <p:cNvPr id="15" name="TextBox 14">
+            <a:extLst>
+              <a:ext uri="{FF2B5EF4-FFF2-40B4-BE49-F238E27FC236}">
+                <a16:creationId xmlns:a16="http://schemas.microsoft.com/office/drawing/2014/main" id="{8749E2A8-303E-E6E4-5CAA-119BD836ACC5}"/>
+              </a:ext>
+            </a:extLst>
+          </p:cNvPr>
+          <p:cNvSpPr txBox="1"/>
+          <p:nvPr/>
+        </p:nvSpPr>
+        <p:spPr>
+          <a:xfrm>
+            <a:off x="4173231" y="657641"/>
+            <a:ext cx="4855900" cy="1169551"/>
+          </a:xfrm>
+          <a:prstGeom prst="rect">
+            <a:avLst/>
+          </a:prstGeom>
+          <a:noFill/>
+        </p:spPr>
+        <p:txBody>
+          <a:bodyPr wrap="square" rtlCol="0">
+            <a:spAutoFit/>
+          </a:bodyPr>
+          <a:lstStyle/>
+          <a:p>
+            <a:pPr marL="285750" lvl="1" indent="-285750">
+              <a:buFont typeface="Arial" panose="020B0604020202020204" pitchFamily="34" charset="0"/>
+              <a:buChar char="•"/>
+            </a:pPr>
+            <a:r>
+              <a:rPr lang="en-US" dirty="0"/>
+              <a:t>Processed data is read </a:t>
+            </a:r>
+            <a:r>
+              <a:rPr lang="en-US" dirty="0" err="1"/>
+              <a:t>llike</a:t>
+            </a:r>
+            <a:r>
+              <a:rPr lang="en-US" dirty="0"/>
+              <a:t> the raw data, using the </a:t>
+            </a:r>
+            <a:r>
+              <a:rPr lang="en-US" dirty="0" err="1"/>
+              <a:t>AnnData</a:t>
+            </a:r>
+            <a:r>
+              <a:rPr lang="en-US" dirty="0"/>
+              <a:t> Python package. </a:t>
+            </a:r>
+          </a:p>
+          <a:p>
+            <a:pPr marL="285750" lvl="1" indent="-285750">
+              <a:buFont typeface="Arial" panose="020B0604020202020204" pitchFamily="34" charset="0"/>
+              <a:buChar char="•"/>
+            </a:pPr>
+            <a:r>
+              <a:rPr lang="en-US" dirty="0"/>
+              <a:t>Processed data: cells(</a:t>
+            </a:r>
+            <a:r>
+              <a:rPr lang="en-US" dirty="0" err="1"/>
+              <a:t>n_obs</a:t>
+            </a:r>
+            <a:r>
+              <a:rPr lang="en-US" dirty="0"/>
+              <a:t>) x genes(</a:t>
+            </a:r>
+            <a:r>
+              <a:rPr lang="en-US" dirty="0" err="1"/>
+              <a:t>n_vars</a:t>
+            </a:r>
+            <a:r>
+              <a:rPr lang="en-US" dirty="0"/>
+              <a:t>) = </a:t>
+            </a:r>
+            <a:r>
+              <a:rPr lang="en-US" b="1" u="sng" dirty="0"/>
+              <a:t>1754 x 15671</a:t>
+            </a:r>
+          </a:p>
+          <a:p>
+            <a:pPr marL="285750" lvl="3" indent="-285750">
+              <a:buFont typeface="Arial" panose="020B0604020202020204" pitchFamily="34" charset="0"/>
+              <a:buChar char="•"/>
+            </a:pPr>
+            <a:r>
+              <a:rPr lang="en-US" dirty="0"/>
+              <a:t>About 99% of cells and 75% of genes were filtered. </a:t>
+            </a:r>
+          </a:p>
+        </p:txBody>
+      </p:sp>
+      <p:sp>
+        <p:nvSpPr>
+          <p:cNvPr id="18" name="TextBox 17">
+            <a:extLst>
+              <a:ext uri="{FF2B5EF4-FFF2-40B4-BE49-F238E27FC236}">
+                <a16:creationId xmlns:a16="http://schemas.microsoft.com/office/drawing/2014/main" id="{C9064172-8470-95C5-0B2B-9759D32A7ECB}"/>
+              </a:ext>
+            </a:extLst>
+          </p:cNvPr>
+          <p:cNvSpPr txBox="1"/>
+          <p:nvPr/>
+        </p:nvSpPr>
+        <p:spPr>
+          <a:xfrm>
+            <a:off x="6114059" y="2101461"/>
+            <a:ext cx="2960439" cy="1815882"/>
+          </a:xfrm>
+          <a:prstGeom prst="rect">
+            <a:avLst/>
+          </a:prstGeom>
+          <a:noFill/>
+        </p:spPr>
+        <p:txBody>
+          <a:bodyPr wrap="square" rtlCol="0">
+            <a:spAutoFit/>
+          </a:bodyPr>
+          <a:lstStyle/>
+          <a:p>
+            <a:pPr marL="285750" indent="-285750">
+              <a:buFont typeface="Arial" panose="020B0604020202020204" pitchFamily="34" charset="0"/>
+              <a:buChar char="•"/>
+            </a:pPr>
+            <a:r>
+              <a:rPr lang="en-US" dirty="0"/>
+              <a:t>This particular pipeline utilizes Leiden clustering which groups cells based on shared features.</a:t>
+            </a:r>
+          </a:p>
+          <a:p>
+            <a:pPr marL="285750" indent="-285750">
+              <a:buFont typeface="Arial" panose="020B0604020202020204" pitchFamily="34" charset="0"/>
+              <a:buChar char="•"/>
+            </a:pPr>
+            <a:r>
+              <a:rPr lang="en-US" dirty="0"/>
+              <a:t>These clusters can then be viewed using a UMAP. </a:t>
+            </a:r>
+          </a:p>
+          <a:p>
+            <a:pPr marL="285750" indent="-285750">
+              <a:buFont typeface="Arial" panose="020B0604020202020204" pitchFamily="34" charset="0"/>
+              <a:buChar char="•"/>
+            </a:pPr>
+            <a:r>
+              <a:rPr lang="en-US" dirty="0"/>
+              <a:t>Furthermore, metadata can be extracted using </a:t>
+            </a:r>
+            <a:r>
+              <a:rPr lang="en-US" dirty="0" err="1"/>
+              <a:t>json</a:t>
+            </a:r>
+            <a:r>
+              <a:rPr lang="en-US" dirty="0"/>
+              <a:t>, providing an overview of the data set.</a:t>
+            </a:r>
+          </a:p>
+        </p:txBody>
+      </p:sp>
+    </p:spTree>
+    <p:extLst>
+      <p:ext uri="{BB962C8B-B14F-4D97-AF65-F5344CB8AC3E}">
+        <p14:creationId xmlns:p14="http://schemas.microsoft.com/office/powerpoint/2010/main" val="1795979855"/>
+      </p:ext>
+    </p:extLst>
+  </p:cSld>
+  <p:clrMapOvr>
+    <a:masterClrMapping/>
+  </p:clrMapOvr>
+</p:sld>
+</file>
+
+<file path=ppt/slides/slide7.xml><?xml version="1.0" encoding="utf-8"?>
+<p:sld xmlns:a="http://schemas.openxmlformats.org/drawingml/2006/main" xmlns:r="http://schemas.openxmlformats.org/officeDocument/2006/relationships" xmlns:p="http://schemas.openxmlformats.org/presentationml/2006/main">
+  <p:cSld>
+    <p:spTree>
+      <p:nvGrpSpPr>
+        <p:cNvPr id="1" name=""/>
+        <p:cNvGrpSpPr/>
+        <p:nvPr/>
+      </p:nvGrpSpPr>
+      <p:grpSpPr>
+        <a:xfrm>
+          <a:off x="0" y="0"/>
+          <a:ext cx="0" cy="0"/>
+          <a:chOff x="0" y="0"/>
+          <a:chExt cx="0" cy="0"/>
+        </a:xfrm>
+      </p:grpSpPr>
+      <p:sp>
+        <p:nvSpPr>
+          <p:cNvPr id="2" name="Title 1">
+            <a:extLst>
+              <a:ext uri="{FF2B5EF4-FFF2-40B4-BE49-F238E27FC236}">
+                <a16:creationId xmlns:a16="http://schemas.microsoft.com/office/drawing/2014/main" id="{80A09578-7F69-701A-95ED-47B5D118BE11}"/>
+              </a:ext>
+            </a:extLst>
+          </p:cNvPr>
+          <p:cNvSpPr>
+            <a:spLocks noGrp="1"/>
+          </p:cNvSpPr>
+          <p:nvPr>
+            <p:ph type="title"/>
+          </p:nvPr>
+        </p:nvSpPr>
+        <p:spPr/>
+        <p:txBody>
+          <a:bodyPr/>
+          <a:lstStyle/>
+          <a:p>
+            <a:r>
+              <a:rPr lang="en-US" dirty="0"/>
+              <a:t>Heart Data Website Integration</a:t>
+            </a:r>
+          </a:p>
+        </p:txBody>
+      </p:sp>
+      <p:sp>
+        <p:nvSpPr>
+          <p:cNvPr id="3" name="Text Placeholder 2">
+            <a:extLst>
+              <a:ext uri="{FF2B5EF4-FFF2-40B4-BE49-F238E27FC236}">
+                <a16:creationId xmlns:a16="http://schemas.microsoft.com/office/drawing/2014/main" id="{DBE27620-88B4-5C81-F2F5-17ED1AC6C66C}"/>
+              </a:ext>
+            </a:extLst>
+          </p:cNvPr>
+          <p:cNvSpPr>
+            <a:spLocks noGrp="1"/>
+          </p:cNvSpPr>
+          <p:nvPr>
+            <p:ph type="body" idx="1"/>
+          </p:nvPr>
+        </p:nvSpPr>
+        <p:spPr/>
+        <p:txBody>
+          <a:bodyPr/>
+          <a:lstStyle/>
+          <a:p>
+            <a:endParaRPr lang="en-US" dirty="0"/>
+          </a:p>
+        </p:txBody>
+      </p:sp>
+    </p:spTree>
+    <p:extLst>
+      <p:ext uri="{BB962C8B-B14F-4D97-AF65-F5344CB8AC3E}">
+        <p14:creationId xmlns:p14="http://schemas.microsoft.com/office/powerpoint/2010/main" val="1582296438"/>
+      </p:ext>
+    </p:extLst>
+  </p:cSld>
+  <p:clrMapOvr>
+    <a:masterClrMapping/>
+  </p:clrMapOvr>
+</p:sld>
+</file>
+
+<file path=ppt/slides/slide8.xml><?xml version="1.0" encoding="utf-8"?>
 <p:sld xmlns:a="http://schemas.openxmlformats.org/drawingml/2006/main" xmlns:r="http://schemas.openxmlformats.org/officeDocument/2006/relationships" xmlns:p="http://schemas.openxmlformats.org/presentationml/2006/main">
   <p:cSld>
     <p:spTree>
@@ -19361,7 +20319,7 @@
             </a:pPr>
             <a:fld id="{00000000-1234-1234-1234-123412341234}" type="slidenum">
               <a:rPr lang="en"/>
-              <a:t>4</a:t>
+              <a:t>8</a:t>
             </a:fld>
             <a:endParaRPr/>
           </a:p>

</xml_diff>

<commit_message>
User interface slide added.
</commit_message>
<xml_diff>
--- a/HuBMAP_template.pptx
+++ b/HuBMAP_template.pptx
@@ -18483,14 +18483,6 @@
               </a:rPr>
             </a:br>
             <a:r>
-              <a:rPr lang="en" sz="3800" dirty="0">
-                <a:solidFill>
-                  <a:srgbClr val="BB002A"/>
-                </a:solidFill>
-              </a:rPr>
-              <a:t>Pipelines for Processing Large </a:t>
-            </a:r>
-            <a:r>
               <a:rPr lang="en" sz="3800" dirty="0" err="1">
                 <a:solidFill>
                   <a:srgbClr val="BB002A"/>
@@ -18504,32 +18496,8 @@
                   <a:srgbClr val="BB002A"/>
                 </a:solidFill>
               </a:rPr>
-              <a:t> Data Sets</a:t>
+              <a:t> Data Processing Pipelines</a:t>
             </a:r>
-            <a:endParaRPr sz="3800" dirty="0">
-              <a:solidFill>
-                <a:srgbClr val="BB002A"/>
-              </a:solidFill>
-            </a:endParaRPr>
-          </a:p>
-          <a:p>
-            <a:pPr marL="0" marR="0" lvl="0" indent="0" algn="ctr" rtl="0">
-              <a:lnSpc>
-                <a:spcPct val="100000"/>
-              </a:lnSpc>
-              <a:spcBef>
-                <a:spcPts val="0"/>
-              </a:spcBef>
-              <a:spcAft>
-                <a:spcPts val="0"/>
-              </a:spcAft>
-              <a:buClr>
-                <a:srgbClr val="BB0000"/>
-              </a:buClr>
-              <a:buSzPts val="3280"/>
-              <a:buFont typeface="Open Sans"/>
-              <a:buNone/>
-            </a:pPr>
             <a:endParaRPr b="0" i="1" u="none" strike="noStrike" cap="none" dirty="0">
               <a:solidFill>
                 <a:srgbClr val="BB002A"/>
@@ -18827,6 +18795,12 @@
               </a:rPr>
               <a:t>Data processing pipeline (~2 Penny on scRNAseq, one workflow, one on results?)</a:t>
             </a:r>
+            <a:endParaRPr lang="en" sz="1600" dirty="0">
+              <a:solidFill>
+                <a:srgbClr val="000000"/>
+              </a:solidFill>
+              <a:latin typeface=""/>
+            </a:endParaRPr>
           </a:p>
           <a:p>
             <a:pPr>
@@ -18981,7 +18955,7 @@
             </a:pPr>
             <a:r>
               <a:rPr lang="en" dirty="0"/>
-              <a:t>Outline</a:t>
+              <a:t>Introduction</a:t>
             </a:r>
             <a:endParaRPr dirty="0"/>
           </a:p>
@@ -18999,8 +18973,8 @@
         </p:nvSpPr>
         <p:spPr>
           <a:xfrm>
-            <a:off x="285750" y="876300"/>
-            <a:ext cx="8714400" cy="3863866"/>
+            <a:off x="87119" y="639817"/>
+            <a:ext cx="8969762" cy="3863866"/>
           </a:xfrm>
           <a:prstGeom prst="rect">
             <a:avLst/>
@@ -19021,12 +18995,20 @@
               <a:buChar char="•"/>
             </a:pPr>
             <a:r>
+              <a:rPr lang="en-US" sz="1800" b="1" dirty="0">
+                <a:solidFill>
+                  <a:schemeClr val="bg2"/>
+                </a:solidFill>
+              </a:rPr>
+              <a:t>Objective:</a:t>
+            </a:r>
+            <a:r>
               <a:rPr lang="en-US" sz="1800" dirty="0">
                 <a:solidFill>
                   <a:schemeClr val="bg2"/>
                 </a:solidFill>
               </a:rPr>
-              <a:t>Pittsburgh Supercomputing Center (PSC) - Joint center of Carnegie Mellon &amp; University of Pittsburgh, providing advanced high performance computer resources for interdisciplinary research.</a:t>
+              <a:t> Develop pipelines to process large-scale biological data sets, and and deliver accessible, user-friendly tools and spatial maps through open interfaces.</a:t>
             </a:r>
           </a:p>
           <a:p>
@@ -19035,6 +19017,22 @@
               <a:buChar char="•"/>
             </a:pPr>
             <a:r>
+              <a:rPr lang="en-US" sz="1800" b="1" dirty="0">
+                <a:solidFill>
+                  <a:schemeClr val="bg2"/>
+                </a:solidFill>
+              </a:rPr>
+              <a:t>Standardization:</a:t>
+            </a:r>
+            <a:r>
+              <a:rPr lang="en-US" sz="1800" dirty="0">
+                <a:solidFill>
+                  <a:schemeClr val="bg2"/>
+                </a:solidFill>
+              </a:rPr>
+              <a:t> </a:t>
+            </a:r>
+            <a:r>
               <a:rPr lang="en-US" sz="1800" dirty="0" err="1">
                 <a:solidFill>
                   <a:schemeClr val="bg2"/>
@@ -19048,111 +19046,7 @@
                   <a:schemeClr val="bg2"/>
                 </a:solidFill>
               </a:rPr>
-              <a:t> Tool Development – Developed pipelines for standardized processing of </a:t>
-            </a:r>
-            <a:r>
-              <a:rPr lang="en-US" sz="1800" dirty="0" err="1">
-                <a:solidFill>
-                  <a:schemeClr val="bg2"/>
-                </a:solidFill>
-              </a:rPr>
-              <a:t>HuBMAP</a:t>
-            </a:r>
-            <a:r>
-              <a:rPr lang="en-US" sz="1800" dirty="0">
-                <a:solidFill>
-                  <a:schemeClr val="bg2"/>
-                </a:solidFill>
-              </a:rPr>
-              <a:t> data:</a:t>
-            </a:r>
-          </a:p>
-          <a:p>
-            <a:pPr marL="800100" lvl="1" indent="-342900">
-              <a:buFont typeface="Arial" panose="020B0604020202020204" pitchFamily="34" charset="0"/>
-              <a:buChar char="•"/>
-            </a:pPr>
-            <a:r>
-              <a:rPr lang="en-US" sz="1800" dirty="0">
-                <a:solidFill>
-                  <a:schemeClr val="bg2"/>
-                </a:solidFill>
-              </a:rPr>
-              <a:t>Single-cell sequencing (</a:t>
-            </a:r>
-            <a:r>
-              <a:rPr lang="en-US" sz="1800" dirty="0" err="1">
-                <a:solidFill>
-                  <a:schemeClr val="bg2"/>
-                </a:solidFill>
-              </a:rPr>
-              <a:t>scRNA</a:t>
-            </a:r>
-            <a:r>
-              <a:rPr lang="en-US" sz="1800" dirty="0">
-                <a:solidFill>
-                  <a:schemeClr val="bg2"/>
-                </a:solidFill>
-              </a:rPr>
-              <a:t>-seq, ATAC-seq)</a:t>
-            </a:r>
-          </a:p>
-          <a:p>
-            <a:pPr marL="800100" lvl="1" indent="-342900">
-              <a:buFont typeface="Arial" panose="020B0604020202020204" pitchFamily="34" charset="0"/>
-              <a:buChar char="•"/>
-            </a:pPr>
-            <a:r>
-              <a:rPr lang="en-US" sz="1800" dirty="0">
-                <a:solidFill>
-                  <a:schemeClr val="bg2"/>
-                </a:solidFill>
-              </a:rPr>
-              <a:t>Imaging data (segmentation, stitching)</a:t>
-            </a:r>
-          </a:p>
-          <a:p>
-            <a:pPr marL="800100" lvl="1" indent="-342900">
-              <a:buFont typeface="Arial" panose="020B0604020202020204" pitchFamily="34" charset="0"/>
-              <a:buChar char="•"/>
-            </a:pPr>
-            <a:r>
-              <a:rPr lang="en-US" sz="1800" dirty="0">
-                <a:solidFill>
-                  <a:schemeClr val="bg2"/>
-                </a:solidFill>
-              </a:rPr>
-              <a:t>Spatial transcriptomics/proteomics (CODEX, </a:t>
-            </a:r>
-            <a:r>
-              <a:rPr lang="en-US" sz="1800" dirty="0" err="1">
-                <a:solidFill>
-                  <a:schemeClr val="bg2"/>
-                </a:solidFill>
-              </a:rPr>
-              <a:t>seqFISH</a:t>
-            </a:r>
-            <a:r>
-              <a:rPr lang="en-US" sz="1800" dirty="0">
-                <a:solidFill>
-                  <a:schemeClr val="bg2"/>
-                </a:solidFill>
-              </a:rPr>
-              <a:t>)</a:t>
-            </a:r>
-          </a:p>
-          <a:p>
-            <a:pPr marL="800100" lvl="1" indent="-342900">
-              <a:buFont typeface="Arial" panose="020B0604020202020204" pitchFamily="34" charset="0"/>
-              <a:buChar char="•"/>
-            </a:pPr>
-            <a:r>
-              <a:rPr lang="en-US" sz="1800" dirty="0">
-                <a:solidFill>
-                  <a:schemeClr val="bg2"/>
-                </a:solidFill>
-              </a:rPr>
-              <a:t>Downstream analysis of image-based data</a:t>
+              <a:t> pipelines uniformly process multimodal data collected across diverse tissue mapping centers.</a:t>
             </a:r>
           </a:p>
           <a:p>
@@ -19161,12 +19055,80 @@
               <a:buChar char="•"/>
             </a:pPr>
             <a:r>
+              <a:rPr lang="en-US" sz="1800" b="1" dirty="0">
+                <a:solidFill>
+                  <a:schemeClr val="bg2"/>
+                </a:solidFill>
+              </a:rPr>
+              <a:t>Analysis Tools:</a:t>
+            </a:r>
+            <a:r>
               <a:rPr lang="en-US" sz="1800" dirty="0">
                 <a:solidFill>
                   <a:schemeClr val="bg2"/>
                 </a:solidFill>
               </a:rPr>
-              <a:t>All tools created are publicly available and integrated into the </a:t>
+              <a:t> Python (</a:t>
+            </a:r>
+            <a:r>
+              <a:rPr lang="en-US" sz="1800" dirty="0" err="1">
+                <a:solidFill>
+                  <a:schemeClr val="bg2"/>
+                </a:solidFill>
+              </a:rPr>
+              <a:t>Jupyter</a:t>
+            </a:r>
+            <a:r>
+              <a:rPr lang="en-US" sz="1800" dirty="0">
+                <a:solidFill>
+                  <a:schemeClr val="bg2"/>
+                </a:solidFill>
+              </a:rPr>
+              <a:t> Notebooks) and domain-specific libraries enable interpretation of both raw and processed data.</a:t>
+            </a:r>
+          </a:p>
+          <a:p>
+            <a:pPr marL="342900" indent="-342900">
+              <a:buFont typeface="Arial" panose="020B0604020202020204" pitchFamily="34" charset="0"/>
+              <a:buChar char="•"/>
+            </a:pPr>
+            <a:r>
+              <a:rPr lang="en-US" sz="1800" b="1" dirty="0">
+                <a:solidFill>
+                  <a:schemeClr val="bg2"/>
+                </a:solidFill>
+              </a:rPr>
+              <a:t>Execution Environment:</a:t>
+            </a:r>
+            <a:r>
+              <a:rPr lang="en-US" sz="1800" dirty="0">
+                <a:solidFill>
+                  <a:schemeClr val="bg2"/>
+                </a:solidFill>
+              </a:rPr>
+              <a:t> Pipelines are run on UNIX-based systems for robust, high-throughput computing.</a:t>
+            </a:r>
+          </a:p>
+          <a:p>
+            <a:pPr marL="342900" indent="-342900">
+              <a:buFont typeface="Arial" panose="020B0604020202020204" pitchFamily="34" charset="0"/>
+              <a:buChar char="•"/>
+            </a:pPr>
+            <a:r>
+              <a:rPr lang="en-US" sz="1800" b="1" dirty="0">
+                <a:solidFill>
+                  <a:schemeClr val="bg2"/>
+                </a:solidFill>
+              </a:rPr>
+              <a:t>Consolidation:</a:t>
+            </a:r>
+            <a:r>
+              <a:rPr lang="en-US" sz="1800" dirty="0">
+                <a:solidFill>
+                  <a:schemeClr val="bg2"/>
+                </a:solidFill>
+              </a:rPr>
+              <a:t> </a:t>
             </a:r>
             <a:r>
               <a:rPr lang="en-US" sz="1800" dirty="0" err="1">
@@ -19182,7 +19144,7 @@
                   <a:schemeClr val="bg2"/>
                 </a:solidFill>
               </a:rPr>
-              <a:t> website, providing a user-friendly interface to interact with complex biological data. </a:t>
+              <a:t> data products compile all datasets for a given assay type and tissue across sources. RNA-seq products include both raw gene count matrices and processed data with normalization, filtering, dimensionality reduction, and clustering.</a:t>
             </a:r>
           </a:p>
         </p:txBody>
@@ -19351,8 +19313,8 @@
         </p:nvSpPr>
         <p:spPr>
           <a:xfrm>
-            <a:off x="90272" y="765371"/>
-            <a:ext cx="4329715" cy="1333848"/>
+            <a:off x="108466" y="912710"/>
+            <a:ext cx="4014095" cy="2380452"/>
           </a:xfrm>
           <a:prstGeom prst="rect">
             <a:avLst/>
@@ -19379,11 +19341,14 @@
           <a:lstStyle/>
           <a:p>
             <a:pPr algn="ctr"/>
-            <a:endParaRPr lang="en-US">
-              <a:solidFill>
-                <a:schemeClr val="bg2"/>
-              </a:solidFill>
-            </a:endParaRPr>
+            <a:r>
+              <a:rPr lang="en-US" dirty="0">
+                <a:solidFill>
+                  <a:schemeClr val="bg2"/>
+                </a:solidFill>
+              </a:rPr>
+              <a:t>z</a:t>
+            </a:r>
           </a:p>
         </p:txBody>
       </p:sp>
@@ -19401,8 +19366,8 @@
         </p:nvSpPr>
         <p:spPr>
           <a:xfrm>
-            <a:off x="90273" y="2196445"/>
-            <a:ext cx="4329714" cy="2587178"/>
+            <a:off x="4938462" y="912711"/>
+            <a:ext cx="4014095" cy="2380452"/>
           </a:xfrm>
           <a:prstGeom prst="rect">
             <a:avLst/>
@@ -19455,12 +19420,15 @@
         </p:blipFill>
         <p:spPr>
           <a:xfrm>
-            <a:off x="159316" y="845825"/>
-            <a:ext cx="4172394" cy="1107167"/>
+            <a:off x="191443" y="1190883"/>
+            <a:ext cx="3830131" cy="1793654"/>
           </a:xfrm>
           <a:prstGeom prst="rect">
             <a:avLst/>
           </a:prstGeom>
+          <a:effectLst>
+            <a:softEdge rad="56070"/>
+          </a:effectLst>
         </p:spPr>
       </p:pic>
       <p:pic>
@@ -19485,12 +19453,15 @@
         </p:blipFill>
         <p:spPr>
           <a:xfrm>
-            <a:off x="2001959" y="2477793"/>
-            <a:ext cx="2106064" cy="2039939"/>
+            <a:off x="6812662" y="1206573"/>
+            <a:ext cx="1994084" cy="1931475"/>
           </a:xfrm>
           <a:prstGeom prst="rect">
             <a:avLst/>
           </a:prstGeom>
+          <a:effectLst>
+            <a:softEdge rad="50800"/>
+          </a:effectLst>
         </p:spPr>
       </p:pic>
       <p:pic>
@@ -19515,20 +19486,23 @@
         </p:blipFill>
         <p:spPr>
           <a:xfrm>
-            <a:off x="214790" y="2327967"/>
-            <a:ext cx="1721935" cy="2350273"/>
+            <a:off x="5063039" y="1008412"/>
+            <a:ext cx="1603812" cy="2189047"/>
           </a:xfrm>
           <a:prstGeom prst="rect">
             <a:avLst/>
           </a:prstGeom>
+          <a:effectLst>
+            <a:softEdge rad="50800"/>
+          </a:effectLst>
         </p:spPr>
       </p:pic>
       <p:sp>
         <p:nvSpPr>
-          <p:cNvPr id="18" name="TextBox 17">
+          <p:cNvPr id="7" name="TextBox 6">
             <a:extLst>
               <a:ext uri="{FF2B5EF4-FFF2-40B4-BE49-F238E27FC236}">
-                <a16:creationId xmlns:a16="http://schemas.microsoft.com/office/drawing/2014/main" id="{5CDAA9CD-711E-916B-229E-617491AB576A}"/>
+                <a16:creationId xmlns:a16="http://schemas.microsoft.com/office/drawing/2014/main" id="{2FCF00EB-EC3A-2936-6486-86A0EF59346B}"/>
               </a:ext>
             </a:extLst>
           </p:cNvPr>
@@ -19537,8 +19511,8 @@
         </p:nvSpPr>
         <p:spPr>
           <a:xfrm>
-            <a:off x="4398745" y="767525"/>
-            <a:ext cx="4514249" cy="1384995"/>
+            <a:off x="124272" y="3536021"/>
+            <a:ext cx="8890562" cy="738664"/>
           </a:xfrm>
           <a:prstGeom prst="rect">
             <a:avLst/>
@@ -19550,20 +19524,6 @@
             <a:spAutoFit/>
           </a:bodyPr>
           <a:lstStyle/>
-          <a:p>
-            <a:pPr marL="285750" indent="-285750">
-              <a:buFont typeface="Arial" panose="020B0604020202020204" pitchFamily="34" charset="0"/>
-              <a:buChar char="•"/>
-            </a:pPr>
-            <a:r>
-              <a:rPr lang="en-US" dirty="0" err="1"/>
-              <a:t>AnnData</a:t>
-            </a:r>
-            <a:r>
-              <a:rPr lang="en-US" dirty="0"/>
-              <a:t> provides essential tools for interpreting and working with complex biological datasets.</a:t>
-            </a:r>
-          </a:p>
           <a:p>
             <a:pPr marL="285750" indent="-285750">
               <a:buFont typeface="Arial" panose="020B0604020202020204" pitchFamily="34" charset="0"/>
@@ -19583,7 +19543,7 @@
             </a:r>
             <a:r>
               <a:rPr lang="en-US" dirty="0"/>
-              <a:t> Python package </a:t>
+              <a:t> Python package, which provides tools for interpreting and working with complex biological datasets.</a:t>
             </a:r>
           </a:p>
           <a:p>
@@ -19593,87 +19553,57 @@
             </a:pPr>
             <a:r>
               <a:rPr lang="en-US" dirty="0"/>
-              <a:t>Pre-processed data: cells(</a:t>
-            </a:r>
-            <a:r>
-              <a:rPr lang="en-US" dirty="0" err="1"/>
-              <a:t>n_obs</a:t>
-            </a:r>
-            <a:r>
-              <a:rPr lang="en-US" dirty="0"/>
-              <a:t>) x genes(</a:t>
-            </a:r>
-            <a:r>
-              <a:rPr lang="en-US" dirty="0" err="1"/>
-              <a:t>n_vars</a:t>
-            </a:r>
-            <a:r>
-              <a:rPr lang="en-US" dirty="0"/>
-              <a:t>) = </a:t>
-            </a:r>
-            <a:r>
-              <a:rPr lang="en-US" b="1" u="sng" dirty="0"/>
-              <a:t>117782 x 60286</a:t>
+              <a:t>The pandas library enables targeted analysis of specific data points.</a:t>
             </a:r>
           </a:p>
         </p:txBody>
       </p:sp>
       <p:sp>
         <p:nvSpPr>
-          <p:cNvPr id="19" name="TextBox 18">
+          <p:cNvPr id="8" name="Right Arrow 7">
             <a:extLst>
               <a:ext uri="{FF2B5EF4-FFF2-40B4-BE49-F238E27FC236}">
-                <a16:creationId xmlns:a16="http://schemas.microsoft.com/office/drawing/2014/main" id="{608BA8C8-A7B3-4F19-0D84-79E180C9E92F}"/>
+                <a16:creationId xmlns:a16="http://schemas.microsoft.com/office/drawing/2014/main" id="{152EFF39-B3DB-848E-7871-C4B1AFBC0F48}"/>
               </a:ext>
             </a:extLst>
           </p:cNvPr>
-          <p:cNvSpPr txBox="1"/>
+          <p:cNvSpPr/>
           <p:nvPr/>
         </p:nvSpPr>
         <p:spPr>
           <a:xfrm>
-            <a:off x="4398745" y="2510769"/>
-            <a:ext cx="4675218" cy="1600438"/>
+            <a:off x="4219534" y="2014837"/>
+            <a:ext cx="631588" cy="314949"/>
           </a:xfrm>
-          <a:prstGeom prst="rect">
+          <a:prstGeom prst="rightArrow">
             <a:avLst/>
           </a:prstGeom>
-          <a:noFill/>
+          <a:solidFill>
+            <a:srgbClr val="FF0000"/>
+          </a:solidFill>
         </p:spPr>
+        <p:style>
+          <a:lnRef idx="2">
+            <a:schemeClr val="accent1">
+              <a:shade val="15000"/>
+            </a:schemeClr>
+          </a:lnRef>
+          <a:fillRef idx="1">
+            <a:schemeClr val="accent1"/>
+          </a:fillRef>
+          <a:effectRef idx="0">
+            <a:schemeClr val="accent1"/>
+          </a:effectRef>
+          <a:fontRef idx="minor">
+            <a:schemeClr val="lt1"/>
+          </a:fontRef>
+        </p:style>
         <p:txBody>
-          <a:bodyPr wrap="square" rtlCol="0">
-            <a:spAutoFit/>
-          </a:bodyPr>
+          <a:bodyPr rtlCol="0" anchor="ctr"/>
           <a:lstStyle/>
           <a:p>
-            <a:pPr marL="285750" indent="-285750">
-              <a:buFont typeface="Arial" panose="020B0604020202020204" pitchFamily="34" charset="0"/>
-              <a:buChar char="•"/>
-            </a:pPr>
-            <a:r>
-              <a:rPr lang="en-US" dirty="0"/>
-              <a:t>The pandas library enables targeted analysis of specific data points. </a:t>
-            </a:r>
-          </a:p>
-          <a:p>
-            <a:pPr marL="285750" indent="-285750">
-              <a:buFont typeface="Arial" panose="020B0604020202020204" pitchFamily="34" charset="0"/>
-              <a:buChar char="•"/>
-            </a:pPr>
-            <a:r>
-              <a:rPr lang="en-US" dirty="0"/>
-              <a:t>We can summarize or visualize the distribution of cell or gene types by label. </a:t>
-            </a:r>
-          </a:p>
-          <a:p>
-            <a:pPr marL="285750" indent="-285750">
-              <a:buFont typeface="Arial" panose="020B0604020202020204" pitchFamily="34" charset="0"/>
-              <a:buChar char="•"/>
-            </a:pPr>
-            <a:r>
-              <a:rPr lang="en-US" dirty="0"/>
-              <a:t>Revealing the composition of cells and genes is helpful with comparison before and after pipeline processing</a:t>
-            </a:r>
+            <a:pPr algn="ctr"/>
+            <a:endParaRPr lang="en-US"/>
           </a:p>
         </p:txBody>
       </p:sp>
@@ -19749,8 +19679,8 @@
         </p:nvSpPr>
         <p:spPr>
           <a:xfrm>
-            <a:off x="69502" y="695912"/>
-            <a:ext cx="4058362" cy="1103333"/>
+            <a:off x="474491" y="3389515"/>
+            <a:ext cx="4547425" cy="1223268"/>
           </a:xfrm>
           <a:prstGeom prst="rect">
             <a:avLst/>
@@ -19799,8 +19729,8 @@
         </p:nvSpPr>
         <p:spPr>
           <a:xfrm>
-            <a:off x="69502" y="2101462"/>
-            <a:ext cx="2948018" cy="2429692"/>
+            <a:off x="507452" y="660939"/>
+            <a:ext cx="3637621" cy="2572880"/>
           </a:xfrm>
           <a:prstGeom prst="rect">
             <a:avLst/>
@@ -19845,8 +19775,8 @@
         </p:nvSpPr>
         <p:spPr>
           <a:xfrm>
-            <a:off x="3062887" y="2101462"/>
-            <a:ext cx="3005805" cy="2429693"/>
+            <a:off x="5021917" y="671003"/>
+            <a:ext cx="3126004" cy="2572879"/>
           </a:xfrm>
           <a:prstGeom prst="rect">
             <a:avLst/>
@@ -19873,7 +19803,7 @@
           <a:lstStyle/>
           <a:p>
             <a:pPr algn="ctr"/>
-            <a:endParaRPr lang="en-US"/>
+            <a:endParaRPr lang="en-US" dirty="0"/>
           </a:p>
         </p:txBody>
       </p:sp>
@@ -19899,12 +19829,15 @@
         </p:blipFill>
         <p:spPr>
           <a:xfrm>
-            <a:off x="114869" y="788437"/>
-            <a:ext cx="3972444" cy="907961"/>
+            <a:off x="522625" y="3492460"/>
+            <a:ext cx="4451155" cy="1017377"/>
           </a:xfrm>
           <a:prstGeom prst="rect">
             <a:avLst/>
           </a:prstGeom>
+          <a:effectLst>
+            <a:softEdge rad="38100"/>
+          </a:effectLst>
         </p:spPr>
       </p:pic>
       <p:pic>
@@ -19929,12 +19862,15 @@
         </p:blipFill>
         <p:spPr>
           <a:xfrm>
-            <a:off x="114869" y="2193545"/>
-            <a:ext cx="2837337" cy="2290489"/>
+            <a:off x="614497" y="755921"/>
+            <a:ext cx="3423530" cy="2425473"/>
           </a:xfrm>
           <a:prstGeom prst="rect">
             <a:avLst/>
           </a:prstGeom>
+          <a:effectLst>
+            <a:softEdge rad="50800"/>
+          </a:effectLst>
         </p:spPr>
       </p:pic>
       <p:pic>
@@ -19959,50 +19895,23 @@
         </p:blipFill>
         <p:spPr>
           <a:xfrm>
-            <a:off x="3373331" y="2489842"/>
-            <a:ext cx="2397336" cy="1994194"/>
+            <a:off x="5133050" y="733489"/>
+            <a:ext cx="2903738" cy="2447905"/>
           </a:xfrm>
           <a:prstGeom prst="rect">
             <a:avLst/>
           </a:prstGeom>
-        </p:spPr>
-      </p:pic>
-      <p:pic>
-        <p:nvPicPr>
-          <p:cNvPr id="13" name="Picture 12">
-            <a:extLst>
-              <a:ext uri="{FF2B5EF4-FFF2-40B4-BE49-F238E27FC236}">
-                <a16:creationId xmlns:a16="http://schemas.microsoft.com/office/drawing/2014/main" id="{F376AA01-7DA9-E380-374E-850022C6C3B0}"/>
-              </a:ext>
-            </a:extLst>
-          </p:cNvPr>
-          <p:cNvPicPr>
-            <a:picLocks noChangeAspect="1"/>
-          </p:cNvPicPr>
-          <p:nvPr/>
-        </p:nvPicPr>
-        <p:blipFill>
-          <a:blip r:embed="rId5"/>
-          <a:stretch>
-            <a:fillRect/>
-          </a:stretch>
-        </p:blipFill>
-        <p:spPr>
-          <a:xfrm>
-            <a:off x="3246377" y="2221633"/>
-            <a:ext cx="2651244" cy="274569"/>
-          </a:xfrm>
-          <a:prstGeom prst="rect">
-            <a:avLst/>
-          </a:prstGeom>
+          <a:effectLst>
+            <a:softEdge rad="50800"/>
+          </a:effectLst>
         </p:spPr>
       </p:pic>
       <p:sp>
         <p:nvSpPr>
-          <p:cNvPr id="15" name="TextBox 14">
+          <p:cNvPr id="3" name="TextBox 2">
             <a:extLst>
               <a:ext uri="{FF2B5EF4-FFF2-40B4-BE49-F238E27FC236}">
-                <a16:creationId xmlns:a16="http://schemas.microsoft.com/office/drawing/2014/main" id="{8749E2A8-303E-E6E4-5CAA-119BD836ACC5}"/>
+                <a16:creationId xmlns:a16="http://schemas.microsoft.com/office/drawing/2014/main" id="{5ED32D7E-5780-63F2-22F2-9D878B8963DF}"/>
               </a:ext>
             </a:extLst>
           </p:cNvPr>
@@ -20011,103 +19920,8 @@
         </p:nvSpPr>
         <p:spPr>
           <a:xfrm>
-            <a:off x="4173231" y="657641"/>
-            <a:ext cx="4855900" cy="1169551"/>
-          </a:xfrm>
-          <a:prstGeom prst="rect">
-            <a:avLst/>
-          </a:prstGeom>
-          <a:noFill/>
-        </p:spPr>
-        <p:txBody>
-          <a:bodyPr wrap="square" rtlCol="0">
-            <a:spAutoFit/>
-          </a:bodyPr>
-          <a:lstStyle/>
-          <a:p>
-            <a:pPr marL="285750" lvl="1" indent="-285750">
-              <a:buFont typeface="Arial" panose="020B0604020202020204" pitchFamily="34" charset="0"/>
-              <a:buChar char="•"/>
-            </a:pPr>
-            <a:r>
-              <a:rPr lang="en-US" dirty="0"/>
-              <a:t>Processed data is read </a:t>
-            </a:r>
-            <a:r>
-              <a:rPr lang="en-US" dirty="0" err="1"/>
-              <a:t>llike</a:t>
-            </a:r>
-            <a:r>
-              <a:rPr lang="en-US" dirty="0"/>
-              <a:t> the raw data, using the </a:t>
-            </a:r>
-            <a:r>
-              <a:rPr lang="en-US" dirty="0" err="1"/>
-              <a:t>AnnData</a:t>
-            </a:r>
-            <a:r>
-              <a:rPr lang="en-US" dirty="0"/>
-              <a:t> Python package. </a:t>
-            </a:r>
-          </a:p>
-          <a:p>
-            <a:pPr marL="285750" lvl="1" indent="-285750">
-              <a:buFont typeface="Arial" panose="020B0604020202020204" pitchFamily="34" charset="0"/>
-              <a:buChar char="•"/>
-            </a:pPr>
-            <a:r>
-              <a:rPr lang="en-US" dirty="0"/>
-              <a:t>Processed data: cells(</a:t>
-            </a:r>
-            <a:r>
-              <a:rPr lang="en-US" dirty="0" err="1"/>
-              <a:t>n_obs</a:t>
-            </a:r>
-            <a:r>
-              <a:rPr lang="en-US" dirty="0"/>
-              <a:t>) x genes(</a:t>
-            </a:r>
-            <a:r>
-              <a:rPr lang="en-US" dirty="0" err="1"/>
-              <a:t>n_vars</a:t>
-            </a:r>
-            <a:r>
-              <a:rPr lang="en-US" dirty="0"/>
-              <a:t>) = </a:t>
-            </a:r>
-            <a:r>
-              <a:rPr lang="en-US" b="1" u="sng" dirty="0"/>
-              <a:t>1754 x 15671</a:t>
-            </a:r>
-          </a:p>
-          <a:p>
-            <a:pPr marL="285750" lvl="3" indent="-285750">
-              <a:buFont typeface="Arial" panose="020B0604020202020204" pitchFamily="34" charset="0"/>
-              <a:buChar char="•"/>
-            </a:pPr>
-            <a:r>
-              <a:rPr lang="en-US" dirty="0"/>
-              <a:t>About 99% of cells and 75% of genes were filtered. </a:t>
-            </a:r>
-          </a:p>
-        </p:txBody>
-      </p:sp>
-      <p:sp>
-        <p:nvSpPr>
-          <p:cNvPr id="18" name="TextBox 17">
-            <a:extLst>
-              <a:ext uri="{FF2B5EF4-FFF2-40B4-BE49-F238E27FC236}">
-                <a16:creationId xmlns:a16="http://schemas.microsoft.com/office/drawing/2014/main" id="{C9064172-8470-95C5-0B2B-9759D32A7ECB}"/>
-              </a:ext>
-            </a:extLst>
-          </p:cNvPr>
-          <p:cNvSpPr txBox="1"/>
-          <p:nvPr/>
-        </p:nvSpPr>
-        <p:spPr>
-          <a:xfrm>
-            <a:off x="6114059" y="2101461"/>
-            <a:ext cx="2960439" cy="1815882"/>
+            <a:off x="4973780" y="3289763"/>
+            <a:ext cx="3825295" cy="1600438"/>
           </a:xfrm>
           <a:prstGeom prst="rect">
             <a:avLst/>
@@ -20126,7 +19940,7 @@
             </a:pPr>
             <a:r>
               <a:rPr lang="en-US" dirty="0"/>
-              <a:t>This particular pipeline utilizes Leiden clustering which groups cells based on shared features.</a:t>
+              <a:t>After processing, about 99% of cells and 75% of genes were filtered out. </a:t>
             </a:r>
           </a:p>
           <a:p>
@@ -20136,7 +19950,7 @@
             </a:pPr>
             <a:r>
               <a:rPr lang="en-US" dirty="0"/>
-              <a:t>These clusters can then be viewed using a UMAP. </a:t>
+              <a:t>Pipeline utilizes Leiden clustering, viewed with UMAPs. </a:t>
             </a:r>
           </a:p>
           <a:p>
@@ -20146,16 +19960,117 @@
             </a:pPr>
             <a:r>
               <a:rPr lang="en-US" dirty="0"/>
-              <a:t>Furthermore, metadata can be extracted using </a:t>
+              <a:t>Metadata gives an overview of the data set.</a:t>
             </a:r>
-            <a:r>
-              <a:rPr lang="en-US" dirty="0" err="1"/>
-              <a:t>json</a:t>
-            </a:r>
-            <a:r>
-              <a:rPr lang="en-US" dirty="0"/>
-              <a:t>, providing an overview of the data set.</a:t>
-            </a:r>
+          </a:p>
+          <a:p>
+            <a:pPr marL="285750" indent="-285750">
+              <a:buFont typeface="Arial" panose="020B0604020202020204" pitchFamily="34" charset="0"/>
+              <a:buChar char="•"/>
+            </a:pPr>
+            <a:endParaRPr lang="en-US" dirty="0"/>
+          </a:p>
+        </p:txBody>
+      </p:sp>
+      <p:sp>
+        <p:nvSpPr>
+          <p:cNvPr id="5" name="Bent Arrow 4">
+            <a:extLst>
+              <a:ext uri="{FF2B5EF4-FFF2-40B4-BE49-F238E27FC236}">
+                <a16:creationId xmlns:a16="http://schemas.microsoft.com/office/drawing/2014/main" id="{5FBE6874-E904-6744-3A34-0F91115D1594}"/>
+              </a:ext>
+            </a:extLst>
+          </p:cNvPr>
+          <p:cNvSpPr/>
+          <p:nvPr/>
+        </p:nvSpPr>
+        <p:spPr>
+          <a:xfrm rot="18883916">
+            <a:off x="33735" y="2940831"/>
+            <a:ext cx="553327" cy="652144"/>
+          </a:xfrm>
+          <a:prstGeom prst="bentArrow">
+            <a:avLst/>
+          </a:prstGeom>
+          <a:solidFill>
+            <a:srgbClr val="FF0000"/>
+          </a:solidFill>
+        </p:spPr>
+        <p:style>
+          <a:lnRef idx="2">
+            <a:schemeClr val="accent1">
+              <a:shade val="15000"/>
+            </a:schemeClr>
+          </a:lnRef>
+          <a:fillRef idx="1">
+            <a:schemeClr val="accent1"/>
+          </a:fillRef>
+          <a:effectRef idx="0">
+            <a:schemeClr val="accent1"/>
+          </a:effectRef>
+          <a:fontRef idx="minor">
+            <a:schemeClr val="lt1"/>
+          </a:fontRef>
+        </p:style>
+        <p:txBody>
+          <a:bodyPr rtlCol="0" anchor="ctr"/>
+          <a:lstStyle/>
+          <a:p>
+            <a:pPr algn="ctr"/>
+            <a:endParaRPr lang="en-US">
+              <a:solidFill>
+                <a:schemeClr val="tx1"/>
+              </a:solidFill>
+            </a:endParaRPr>
+          </a:p>
+        </p:txBody>
+      </p:sp>
+      <p:sp>
+        <p:nvSpPr>
+          <p:cNvPr id="7" name="Right Arrow 6">
+            <a:extLst>
+              <a:ext uri="{FF2B5EF4-FFF2-40B4-BE49-F238E27FC236}">
+                <a16:creationId xmlns:a16="http://schemas.microsoft.com/office/drawing/2014/main" id="{A18DB5E4-7940-6917-0A4E-0CE23C83D4AA}"/>
+              </a:ext>
+            </a:extLst>
+          </p:cNvPr>
+          <p:cNvSpPr/>
+          <p:nvPr/>
+        </p:nvSpPr>
+        <p:spPr>
+          <a:xfrm>
+            <a:off x="4256206" y="1980463"/>
+            <a:ext cx="631588" cy="314949"/>
+          </a:xfrm>
+          <a:prstGeom prst="rightArrow">
+            <a:avLst/>
+          </a:prstGeom>
+          <a:solidFill>
+            <a:srgbClr val="FF0000"/>
+          </a:solidFill>
+        </p:spPr>
+        <p:style>
+          <a:lnRef idx="2">
+            <a:schemeClr val="accent1">
+              <a:shade val="15000"/>
+            </a:schemeClr>
+          </a:lnRef>
+          <a:fillRef idx="1">
+            <a:schemeClr val="accent1"/>
+          </a:fillRef>
+          <a:effectRef idx="0">
+            <a:schemeClr val="accent1"/>
+          </a:effectRef>
+          <a:fontRef idx="minor">
+            <a:schemeClr val="lt1"/>
+          </a:fontRef>
+        </p:style>
+        <p:txBody>
+          <a:bodyPr rtlCol="0" anchor="ctr"/>
+          <a:lstStyle/>
+          <a:p>
+            <a:pPr algn="ctr"/>
+            <a:endParaRPr lang="en-US"/>
           </a:p>
         </p:txBody>
       </p:sp>
@@ -20212,33 +20127,488 @@
           <a:p>
             <a:r>
               <a:rPr lang="en-US" dirty="0"/>
-              <a:t>Heart Data Website Integration</a:t>
+              <a:t>User Interface</a:t>
             </a:r>
           </a:p>
         </p:txBody>
       </p:sp>
       <p:sp>
         <p:nvSpPr>
-          <p:cNvPr id="3" name="Text Placeholder 2">
+          <p:cNvPr id="13" name="Rectangle 12">
             <a:extLst>
               <a:ext uri="{FF2B5EF4-FFF2-40B4-BE49-F238E27FC236}">
-                <a16:creationId xmlns:a16="http://schemas.microsoft.com/office/drawing/2014/main" id="{DBE27620-88B4-5C81-F2F5-17ED1AC6C66C}"/>
+                <a16:creationId xmlns:a16="http://schemas.microsoft.com/office/drawing/2014/main" id="{2BB76799-8B39-6F21-EFEC-3A8E6BA947D6}"/>
               </a:ext>
             </a:extLst>
           </p:cNvPr>
-          <p:cNvSpPr>
-            <a:spLocks noGrp="1"/>
-          </p:cNvSpPr>
-          <p:nvPr>
-            <p:ph type="body" idx="1"/>
-          </p:nvPr>
+          <p:cNvSpPr/>
+          <p:nvPr/>
         </p:nvSpPr>
-        <p:spPr/>
+        <p:spPr>
+          <a:xfrm>
+            <a:off x="86264" y="688259"/>
+            <a:ext cx="4070555" cy="2271252"/>
+          </a:xfrm>
+          <a:prstGeom prst="rect">
+            <a:avLst/>
+          </a:prstGeom>
+        </p:spPr>
+        <p:style>
+          <a:lnRef idx="2">
+            <a:schemeClr val="accent1">
+              <a:shade val="15000"/>
+            </a:schemeClr>
+          </a:lnRef>
+          <a:fillRef idx="1">
+            <a:schemeClr val="accent1"/>
+          </a:fillRef>
+          <a:effectRef idx="0">
+            <a:schemeClr val="accent1"/>
+          </a:effectRef>
+          <a:fontRef idx="minor">
+            <a:schemeClr val="lt1"/>
+          </a:fontRef>
+        </p:style>
         <p:txBody>
-          <a:bodyPr/>
+          <a:bodyPr rtlCol="0" anchor="ctr"/>
           <a:lstStyle/>
           <a:p>
-            <a:endParaRPr lang="en-US" dirty="0"/>
+            <a:pPr algn="ctr"/>
+            <a:endParaRPr lang="en-US"/>
+          </a:p>
+        </p:txBody>
+      </p:sp>
+      <p:pic>
+        <p:nvPicPr>
+          <p:cNvPr id="9" name="Picture 8" descr="A table with numbers and symbols&#10;&#10;AI-generated content may be incorrect.">
+            <a:extLst>
+              <a:ext uri="{FF2B5EF4-FFF2-40B4-BE49-F238E27FC236}">
+                <a16:creationId xmlns:a16="http://schemas.microsoft.com/office/drawing/2014/main" id="{9CF1F942-7EFD-9EEA-697C-AA83934D7E5D}"/>
+              </a:ext>
+            </a:extLst>
+          </p:cNvPr>
+          <p:cNvPicPr>
+            <a:picLocks noChangeAspect="1"/>
+          </p:cNvPicPr>
+          <p:nvPr/>
+        </p:nvPicPr>
+        <p:blipFill>
+          <a:blip r:embed="rId2"/>
+          <a:stretch>
+            <a:fillRect/>
+          </a:stretch>
+        </p:blipFill>
+        <p:spPr>
+          <a:xfrm>
+            <a:off x="155358" y="812990"/>
+            <a:ext cx="3918722" cy="2042021"/>
+          </a:xfrm>
+          <a:prstGeom prst="rect">
+            <a:avLst/>
+          </a:prstGeom>
+          <a:effectLst>
+            <a:softEdge rad="25400"/>
+          </a:effectLst>
+        </p:spPr>
+      </p:pic>
+      <p:sp>
+        <p:nvSpPr>
+          <p:cNvPr id="11" name="Rectangle 10">
+            <a:extLst>
+              <a:ext uri="{FF2B5EF4-FFF2-40B4-BE49-F238E27FC236}">
+                <a16:creationId xmlns:a16="http://schemas.microsoft.com/office/drawing/2014/main" id="{B94B5B5A-7BA9-E2AE-4501-76F39E862769}"/>
+              </a:ext>
+            </a:extLst>
+          </p:cNvPr>
+          <p:cNvSpPr/>
+          <p:nvPr/>
+        </p:nvSpPr>
+        <p:spPr>
+          <a:xfrm>
+            <a:off x="155358" y="2391755"/>
+            <a:ext cx="3918722" cy="223100"/>
+          </a:xfrm>
+          <a:prstGeom prst="rect">
+            <a:avLst/>
+          </a:prstGeom>
+          <a:solidFill>
+            <a:srgbClr val="FFFF00">
+              <a:alpha val="45592"/>
+            </a:srgbClr>
+          </a:solidFill>
+        </p:spPr>
+        <p:style>
+          <a:lnRef idx="2">
+            <a:schemeClr val="accent1">
+              <a:shade val="15000"/>
+            </a:schemeClr>
+          </a:lnRef>
+          <a:fillRef idx="1">
+            <a:schemeClr val="accent1"/>
+          </a:fillRef>
+          <a:effectRef idx="0">
+            <a:schemeClr val="accent1"/>
+          </a:effectRef>
+          <a:fontRef idx="minor">
+            <a:schemeClr val="lt1"/>
+          </a:fontRef>
+        </p:style>
+        <p:txBody>
+          <a:bodyPr rtlCol="0" anchor="ctr"/>
+          <a:lstStyle/>
+          <a:p>
+            <a:pPr algn="ctr"/>
+            <a:endParaRPr lang="en-US" dirty="0">
+              <a:solidFill>
+                <a:srgbClr val="FFFF00"/>
+              </a:solidFill>
+            </a:endParaRPr>
+          </a:p>
+        </p:txBody>
+      </p:sp>
+      <p:sp>
+        <p:nvSpPr>
+          <p:cNvPr id="12" name="Right Arrow 11">
+            <a:extLst>
+              <a:ext uri="{FF2B5EF4-FFF2-40B4-BE49-F238E27FC236}">
+                <a16:creationId xmlns:a16="http://schemas.microsoft.com/office/drawing/2014/main" id="{9AA954B2-D664-F146-DC77-E6D2556962F8}"/>
+              </a:ext>
+            </a:extLst>
+          </p:cNvPr>
+          <p:cNvSpPr/>
+          <p:nvPr/>
+        </p:nvSpPr>
+        <p:spPr>
+          <a:xfrm>
+            <a:off x="4256206" y="1980463"/>
+            <a:ext cx="631588" cy="314949"/>
+          </a:xfrm>
+          <a:prstGeom prst="rightArrow">
+            <a:avLst/>
+          </a:prstGeom>
+          <a:solidFill>
+            <a:srgbClr val="FF0000"/>
+          </a:solidFill>
+        </p:spPr>
+        <p:style>
+          <a:lnRef idx="2">
+            <a:schemeClr val="accent1">
+              <a:shade val="15000"/>
+            </a:schemeClr>
+          </a:lnRef>
+          <a:fillRef idx="1">
+            <a:schemeClr val="accent1"/>
+          </a:fillRef>
+          <a:effectRef idx="0">
+            <a:schemeClr val="accent1"/>
+          </a:effectRef>
+          <a:fontRef idx="minor">
+            <a:schemeClr val="lt1"/>
+          </a:fontRef>
+        </p:style>
+        <p:txBody>
+          <a:bodyPr rtlCol="0" anchor="ctr"/>
+          <a:lstStyle/>
+          <a:p>
+            <a:pPr algn="ctr"/>
+            <a:endParaRPr lang="en-US"/>
+          </a:p>
+        </p:txBody>
+      </p:sp>
+      <p:sp>
+        <p:nvSpPr>
+          <p:cNvPr id="16" name="Rectangle 15">
+            <a:extLst>
+              <a:ext uri="{FF2B5EF4-FFF2-40B4-BE49-F238E27FC236}">
+                <a16:creationId xmlns:a16="http://schemas.microsoft.com/office/drawing/2014/main" id="{428B18E9-6A35-2DA2-A0F6-E8F0058753CE}"/>
+              </a:ext>
+            </a:extLst>
+          </p:cNvPr>
+          <p:cNvSpPr/>
+          <p:nvPr/>
+        </p:nvSpPr>
+        <p:spPr>
+          <a:xfrm>
+            <a:off x="4987181" y="688259"/>
+            <a:ext cx="4001461" cy="2271252"/>
+          </a:xfrm>
+          <a:prstGeom prst="rect">
+            <a:avLst/>
+          </a:prstGeom>
+        </p:spPr>
+        <p:style>
+          <a:lnRef idx="2">
+            <a:schemeClr val="accent1">
+              <a:shade val="15000"/>
+            </a:schemeClr>
+          </a:lnRef>
+          <a:fillRef idx="1">
+            <a:schemeClr val="accent1"/>
+          </a:fillRef>
+          <a:effectRef idx="0">
+            <a:schemeClr val="accent1"/>
+          </a:effectRef>
+          <a:fontRef idx="minor">
+            <a:schemeClr val="lt1"/>
+          </a:fontRef>
+        </p:style>
+        <p:txBody>
+          <a:bodyPr rtlCol="0" anchor="ctr"/>
+          <a:lstStyle/>
+          <a:p>
+            <a:pPr algn="ctr"/>
+            <a:endParaRPr lang="en-US"/>
+          </a:p>
+        </p:txBody>
+      </p:sp>
+      <p:pic>
+        <p:nvPicPr>
+          <p:cNvPr id="15" name="Picture 14" descr="A screenshot of a computer&#10;&#10;AI-generated content may be incorrect.">
+            <a:extLst>
+              <a:ext uri="{FF2B5EF4-FFF2-40B4-BE49-F238E27FC236}">
+                <a16:creationId xmlns:a16="http://schemas.microsoft.com/office/drawing/2014/main" id="{EBBF282E-B41D-720C-EEBC-DF5ADD527EC6}"/>
+              </a:ext>
+            </a:extLst>
+          </p:cNvPr>
+          <p:cNvPicPr>
+            <a:picLocks noChangeAspect="1"/>
+          </p:cNvPicPr>
+          <p:nvPr/>
+        </p:nvPicPr>
+        <p:blipFill>
+          <a:blip r:embed="rId3"/>
+          <a:stretch>
+            <a:fillRect/>
+          </a:stretch>
+        </p:blipFill>
+        <p:spPr>
+          <a:xfrm>
+            <a:off x="5094758" y="764245"/>
+            <a:ext cx="3771057" cy="2090766"/>
+          </a:xfrm>
+          <a:prstGeom prst="rect">
+            <a:avLst/>
+          </a:prstGeom>
+          <a:effectLst>
+            <a:softEdge rad="25400"/>
+          </a:effectLst>
+        </p:spPr>
+      </p:pic>
+      <p:sp>
+        <p:nvSpPr>
+          <p:cNvPr id="17" name="Right Arrow 16">
+            <a:extLst>
+              <a:ext uri="{FF2B5EF4-FFF2-40B4-BE49-F238E27FC236}">
+                <a16:creationId xmlns:a16="http://schemas.microsoft.com/office/drawing/2014/main" id="{8D88E4EA-0ED9-7CF5-BC97-53E204A19A5D}"/>
+              </a:ext>
+            </a:extLst>
+          </p:cNvPr>
+          <p:cNvSpPr/>
+          <p:nvPr/>
+        </p:nvSpPr>
+        <p:spPr>
+          <a:xfrm rot="9183329">
+            <a:off x="4235779" y="2981011"/>
+            <a:ext cx="631588" cy="314949"/>
+          </a:xfrm>
+          <a:prstGeom prst="rightArrow">
+            <a:avLst/>
+          </a:prstGeom>
+          <a:solidFill>
+            <a:srgbClr val="FF0000"/>
+          </a:solidFill>
+        </p:spPr>
+        <p:style>
+          <a:lnRef idx="2">
+            <a:schemeClr val="accent1">
+              <a:shade val="15000"/>
+            </a:schemeClr>
+          </a:lnRef>
+          <a:fillRef idx="1">
+            <a:schemeClr val="accent1"/>
+          </a:fillRef>
+          <a:effectRef idx="0">
+            <a:schemeClr val="accent1"/>
+          </a:effectRef>
+          <a:fontRef idx="minor">
+            <a:schemeClr val="lt1"/>
+          </a:fontRef>
+        </p:style>
+        <p:txBody>
+          <a:bodyPr rtlCol="0" anchor="ctr"/>
+          <a:lstStyle/>
+          <a:p>
+            <a:pPr algn="ctr"/>
+            <a:endParaRPr lang="en-US"/>
+          </a:p>
+        </p:txBody>
+      </p:sp>
+      <p:sp>
+        <p:nvSpPr>
+          <p:cNvPr id="18" name="Rectangle 17">
+            <a:extLst>
+              <a:ext uri="{FF2B5EF4-FFF2-40B4-BE49-F238E27FC236}">
+                <a16:creationId xmlns:a16="http://schemas.microsoft.com/office/drawing/2014/main" id="{C80892A1-DBCA-3D2E-0756-BE3905DCDC05}"/>
+              </a:ext>
+            </a:extLst>
+          </p:cNvPr>
+          <p:cNvSpPr/>
+          <p:nvPr/>
+        </p:nvSpPr>
+        <p:spPr>
+          <a:xfrm>
+            <a:off x="86264" y="3094892"/>
+            <a:ext cx="4070555" cy="1652954"/>
+          </a:xfrm>
+          <a:prstGeom prst="rect">
+            <a:avLst/>
+          </a:prstGeom>
+        </p:spPr>
+        <p:style>
+          <a:lnRef idx="2">
+            <a:schemeClr val="accent1">
+              <a:shade val="15000"/>
+            </a:schemeClr>
+          </a:lnRef>
+          <a:fillRef idx="1">
+            <a:schemeClr val="accent1"/>
+          </a:fillRef>
+          <a:effectRef idx="0">
+            <a:schemeClr val="accent1"/>
+          </a:effectRef>
+          <a:fontRef idx="minor">
+            <a:schemeClr val="lt1"/>
+          </a:fontRef>
+        </p:style>
+        <p:txBody>
+          <a:bodyPr rtlCol="0" anchor="ctr"/>
+          <a:lstStyle/>
+          <a:p>
+            <a:pPr algn="ctr"/>
+            <a:endParaRPr lang="en-US"/>
+          </a:p>
+        </p:txBody>
+      </p:sp>
+      <p:pic>
+        <p:nvPicPr>
+          <p:cNvPr id="20" name="Picture 19" descr="A screenshot of a computer screen&#10;&#10;AI-generated content may be incorrect.">
+            <a:extLst>
+              <a:ext uri="{FF2B5EF4-FFF2-40B4-BE49-F238E27FC236}">
+                <a16:creationId xmlns:a16="http://schemas.microsoft.com/office/drawing/2014/main" id="{7CF0B7C8-2FA6-8E66-62EC-3DACDDF3493C}"/>
+              </a:ext>
+            </a:extLst>
+          </p:cNvPr>
+          <p:cNvPicPr>
+            <a:picLocks noChangeAspect="1"/>
+          </p:cNvPicPr>
+          <p:nvPr/>
+        </p:nvPicPr>
+        <p:blipFill>
+          <a:blip r:embed="rId4"/>
+          <a:stretch>
+            <a:fillRect/>
+          </a:stretch>
+        </p:blipFill>
+        <p:spPr>
+          <a:xfrm>
+            <a:off x="316523" y="3185336"/>
+            <a:ext cx="3470031" cy="1472066"/>
+          </a:xfrm>
+          <a:prstGeom prst="rect">
+            <a:avLst/>
+          </a:prstGeom>
+          <a:effectLst>
+            <a:softEdge rad="12700"/>
+          </a:effectLst>
+        </p:spPr>
+      </p:pic>
+      <p:sp>
+        <p:nvSpPr>
+          <p:cNvPr id="24" name="TextBox 23">
+            <a:extLst>
+              <a:ext uri="{FF2B5EF4-FFF2-40B4-BE49-F238E27FC236}">
+                <a16:creationId xmlns:a16="http://schemas.microsoft.com/office/drawing/2014/main" id="{EDD9DF45-44A2-1044-A0B0-5493D2AEC240}"/>
+              </a:ext>
+            </a:extLst>
+          </p:cNvPr>
+          <p:cNvSpPr txBox="1"/>
+          <p:nvPr/>
+        </p:nvSpPr>
+        <p:spPr>
+          <a:xfrm>
+            <a:off x="4987181" y="3324454"/>
+            <a:ext cx="4084199" cy="954107"/>
+          </a:xfrm>
+          <a:prstGeom prst="rect">
+            <a:avLst/>
+          </a:prstGeom>
+          <a:noFill/>
+        </p:spPr>
+        <p:txBody>
+          <a:bodyPr wrap="square" rtlCol="0">
+            <a:spAutoFit/>
+          </a:bodyPr>
+          <a:lstStyle/>
+          <a:p>
+            <a:pPr marL="285750" indent="-285750">
+              <a:buFont typeface="Arial" panose="020B0604020202020204" pitchFamily="34" charset="0"/>
+              <a:buChar char="•"/>
+            </a:pPr>
+            <a:r>
+              <a:rPr lang="en-US" dirty="0"/>
+              <a:t>Metadata is integrated into the user interface, with tissue type overviews provided. Shiny app enables both gene and cell-level insights/comparisons.</a:t>
+            </a:r>
+          </a:p>
+        </p:txBody>
+      </p:sp>
+      <p:sp>
+        <p:nvSpPr>
+          <p:cNvPr id="25" name="Rectangle 24">
+            <a:extLst>
+              <a:ext uri="{FF2B5EF4-FFF2-40B4-BE49-F238E27FC236}">
+                <a16:creationId xmlns:a16="http://schemas.microsoft.com/office/drawing/2014/main" id="{D5EEFB31-4A54-501A-E4C8-950DAAD42B28}"/>
+              </a:ext>
+            </a:extLst>
+          </p:cNvPr>
+          <p:cNvSpPr/>
+          <p:nvPr/>
+        </p:nvSpPr>
+        <p:spPr>
+          <a:xfrm>
+            <a:off x="6770760" y="1405784"/>
+            <a:ext cx="431563" cy="115367"/>
+          </a:xfrm>
+          <a:prstGeom prst="rect">
+            <a:avLst/>
+          </a:prstGeom>
+          <a:solidFill>
+            <a:srgbClr val="FFFF00">
+              <a:alpha val="46196"/>
+            </a:srgbClr>
+          </a:solidFill>
+        </p:spPr>
+        <p:style>
+          <a:lnRef idx="2">
+            <a:schemeClr val="accent1">
+              <a:shade val="15000"/>
+            </a:schemeClr>
+          </a:lnRef>
+          <a:fillRef idx="1">
+            <a:schemeClr val="accent1"/>
+          </a:fillRef>
+          <a:effectRef idx="0">
+            <a:schemeClr val="accent1"/>
+          </a:effectRef>
+          <a:fontRef idx="minor">
+            <a:schemeClr val="lt1"/>
+          </a:fontRef>
+        </p:style>
+        <p:txBody>
+          <a:bodyPr rtlCol="0" anchor="ctr"/>
+          <a:lstStyle/>
+          <a:p>
+            <a:pPr algn="ctr"/>
+            <a:endParaRPr lang="en-US"/>
           </a:p>
         </p:txBody>
       </p:sp>

</xml_diff>